<commit_message>
Tenyleg a vegleges mostmar!!!!!!!!
</commit_message>
<xml_diff>
--- a/VÉGLEGES PROJEKT/PROJECT/Presentation/Football Shop Webprogramozás Projekt bemutatója.pptx
+++ b/VÉGLEGES PROJEKT/PROJECT/Presentation/Football Shop Webprogramozás Projekt bemutatója.pptx
@@ -11,7 +11,11 @@
     <p:sldId id="259" r:id="rId5"/>
     <p:sldId id="260" r:id="rId6"/>
     <p:sldId id="261" r:id="rId7"/>
-    <p:sldId id="262" r:id="rId8"/>
+    <p:sldId id="263" r:id="rId8"/>
+    <p:sldId id="262" r:id="rId9"/>
+    <p:sldId id="264" r:id="rId10"/>
+    <p:sldId id="265" r:id="rId11"/>
+    <p:sldId id="266" r:id="rId12"/>
   </p:sldIdLst>
   <p:sldSz cx="12192000" cy="6858000"/>
   <p:notesSz cx="6858000" cy="9144000"/>
@@ -110,6 +114,11 @@
       </a:defRPr>
     </a:lvl9pPr>
   </p:defaultTextStyle>
+  <p:extLst>
+    <p:ext uri="{EFAFB233-063F-42B5-8137-9DF3F51BA10A}">
+      <p15:sldGuideLst xmlns:p15="http://schemas.microsoft.com/office/powerpoint/2012/main"/>
+    </p:ext>
+  </p:extLst>
 </p:presentation>
 </file>
 
@@ -5444,6 +5453,502 @@
 </p:sld>
 </file>
 
+<file path=ppt/slides/slide10.xml><?xml version="1.0" encoding="utf-8"?>
+<p:sld xmlns:a="http://schemas.openxmlformats.org/drawingml/2006/main" xmlns:r="http://schemas.openxmlformats.org/officeDocument/2006/relationships" xmlns:p="http://schemas.openxmlformats.org/presentationml/2006/main">
+  <p:cSld>
+    <p:spTree>
+      <p:nvGrpSpPr>
+        <p:cNvPr id="1" name=""/>
+        <p:cNvGrpSpPr/>
+        <p:nvPr/>
+      </p:nvGrpSpPr>
+      <p:grpSpPr>
+        <a:xfrm>
+          <a:off x="0" y="0"/>
+          <a:ext cx="0" cy="0"/>
+          <a:chOff x="0" y="0"/>
+          <a:chExt cx="0" cy="0"/>
+        </a:xfrm>
+      </p:grpSpPr>
+      <p:sp>
+        <p:nvSpPr>
+          <p:cNvPr id="2" name="Title 1">
+            <a:extLst>
+              <a:ext uri="{FF2B5EF4-FFF2-40B4-BE49-F238E27FC236}">
+                <a16:creationId xmlns:a16="http://schemas.microsoft.com/office/drawing/2014/main" id="{1C93A266-5455-2858-DA06-3A41B0DCC025}"/>
+              </a:ext>
+            </a:extLst>
+          </p:cNvPr>
+          <p:cNvSpPr>
+            <a:spLocks noGrp="1"/>
+          </p:cNvSpPr>
+          <p:nvPr>
+            <p:ph type="title"/>
+          </p:nvPr>
+        </p:nvSpPr>
+        <p:spPr>
+          <a:xfrm>
+            <a:off x="684212" y="153272"/>
+            <a:ext cx="5037858" cy="763398"/>
+          </a:xfrm>
+        </p:spPr>
+        <p:txBody>
+          <a:bodyPr/>
+          <a:lstStyle/>
+          <a:p>
+            <a:r>
+              <a:rPr lang="hu-HU" dirty="0"/>
+              <a:t>Webshop működése</a:t>
+            </a:r>
+            <a:endParaRPr lang="en-US" dirty="0"/>
+          </a:p>
+        </p:txBody>
+      </p:sp>
+      <p:sp>
+        <p:nvSpPr>
+          <p:cNvPr id="3" name="Content Placeholder 2">
+            <a:extLst>
+              <a:ext uri="{FF2B5EF4-FFF2-40B4-BE49-F238E27FC236}">
+                <a16:creationId xmlns:a16="http://schemas.microsoft.com/office/drawing/2014/main" id="{8DD687C3-5AEB-65E2-1CB8-81917429F7D1}"/>
+              </a:ext>
+            </a:extLst>
+          </p:cNvPr>
+          <p:cNvSpPr>
+            <a:spLocks noGrp="1"/>
+          </p:cNvSpPr>
+          <p:nvPr>
+            <p:ph idx="1"/>
+          </p:nvPr>
+        </p:nvSpPr>
+        <p:spPr>
+          <a:xfrm>
+            <a:off x="684212" y="1006310"/>
+            <a:ext cx="5411788" cy="5851690"/>
+          </a:xfrm>
+        </p:spPr>
+        <p:txBody>
+          <a:bodyPr>
+            <a:normAutofit/>
+          </a:bodyPr>
+          <a:lstStyle/>
+          <a:p>
+            <a:r>
+              <a:rPr lang="en-US" dirty="0" err="1">
+                <a:solidFill>
+                  <a:schemeClr val="bg1"/>
+                </a:solidFill>
+              </a:rPr>
+              <a:t>Rendelések</a:t>
+            </a:r>
+            <a:r>
+              <a:rPr lang="en-US" dirty="0">
+                <a:solidFill>
+                  <a:schemeClr val="bg1"/>
+                </a:solidFill>
+              </a:rPr>
+              <a:t> </a:t>
+            </a:r>
+            <a:r>
+              <a:rPr lang="en-US" dirty="0" err="1">
+                <a:solidFill>
+                  <a:schemeClr val="bg1"/>
+                </a:solidFill>
+              </a:rPr>
+              <a:t>visszakeresése</a:t>
+            </a:r>
+            <a:r>
+              <a:rPr lang="en-US" dirty="0">
+                <a:solidFill>
+                  <a:schemeClr val="bg1"/>
+                </a:solidFill>
+              </a:rPr>
+              <a:t> </a:t>
+            </a:r>
+            <a:r>
+              <a:rPr lang="en-US" dirty="0" err="1">
+                <a:solidFill>
+                  <a:schemeClr val="bg1"/>
+                </a:solidFill>
+              </a:rPr>
+              <a:t>és</a:t>
+            </a:r>
+            <a:r>
+              <a:rPr lang="en-US" dirty="0">
+                <a:solidFill>
+                  <a:schemeClr val="bg1"/>
+                </a:solidFill>
+              </a:rPr>
+              <a:t> </a:t>
+            </a:r>
+            <a:r>
+              <a:rPr lang="en-US" dirty="0" err="1">
+                <a:solidFill>
+                  <a:schemeClr val="bg1"/>
+                </a:solidFill>
+              </a:rPr>
+              <a:t>lemondása</a:t>
+            </a:r>
+            <a:r>
+              <a:rPr lang="en-US" dirty="0">
+                <a:solidFill>
+                  <a:schemeClr val="bg1"/>
+                </a:solidFill>
+              </a:rPr>
+              <a:t>: </a:t>
+            </a:r>
+          </a:p>
+          <a:p>
+            <a:pPr marL="0" indent="0">
+              <a:buNone/>
+            </a:pPr>
+            <a:endParaRPr lang="en-US" dirty="0">
+              <a:solidFill>
+                <a:schemeClr val="bg1"/>
+              </a:solidFill>
+            </a:endParaRPr>
+          </a:p>
+          <a:p>
+            <a:pPr marL="0" indent="0">
+              <a:buNone/>
+            </a:pPr>
+            <a:r>
+              <a:rPr lang="en-US" dirty="0">
+                <a:solidFill>
+                  <a:schemeClr val="bg1"/>
+                </a:solidFill>
+              </a:rPr>
+              <a:t>A </a:t>
+            </a:r>
+            <a:r>
+              <a:rPr lang="en-US" dirty="0" err="1">
+                <a:solidFill>
+                  <a:schemeClr val="bg1"/>
+                </a:solidFill>
+              </a:rPr>
+              <a:t>felhasználók</a:t>
+            </a:r>
+            <a:r>
+              <a:rPr lang="en-US" dirty="0">
+                <a:solidFill>
+                  <a:schemeClr val="bg1"/>
+                </a:solidFill>
+              </a:rPr>
+              <a:t> </a:t>
+            </a:r>
+            <a:r>
+              <a:rPr lang="en-US" dirty="0" err="1">
+                <a:solidFill>
+                  <a:schemeClr val="bg1"/>
+                </a:solidFill>
+              </a:rPr>
+              <a:t>visszakereshetik</a:t>
+            </a:r>
+            <a:r>
+              <a:rPr lang="en-US" dirty="0">
+                <a:solidFill>
+                  <a:schemeClr val="bg1"/>
+                </a:solidFill>
+              </a:rPr>
+              <a:t> </a:t>
+            </a:r>
+            <a:r>
+              <a:rPr lang="en-US" dirty="0" err="1">
+                <a:solidFill>
+                  <a:schemeClr val="bg1"/>
+                </a:solidFill>
+              </a:rPr>
+              <a:t>korábbi</a:t>
+            </a:r>
+            <a:r>
+              <a:rPr lang="en-US" dirty="0">
+                <a:solidFill>
+                  <a:schemeClr val="bg1"/>
+                </a:solidFill>
+              </a:rPr>
+              <a:t> </a:t>
+            </a:r>
+            <a:r>
+              <a:rPr lang="en-US" dirty="0" err="1">
+                <a:solidFill>
+                  <a:schemeClr val="bg1"/>
+                </a:solidFill>
+              </a:rPr>
+              <a:t>rendeléseiket</a:t>
+            </a:r>
+            <a:r>
+              <a:rPr lang="en-US" dirty="0">
+                <a:solidFill>
+                  <a:schemeClr val="bg1"/>
+                </a:solidFill>
+              </a:rPr>
+              <a:t>, </a:t>
+            </a:r>
+            <a:r>
+              <a:rPr lang="en-US" dirty="0" err="1">
+                <a:solidFill>
+                  <a:schemeClr val="bg1"/>
+                </a:solidFill>
+              </a:rPr>
+              <a:t>és</a:t>
+            </a:r>
+            <a:r>
+              <a:rPr lang="en-US" dirty="0">
+                <a:solidFill>
+                  <a:schemeClr val="bg1"/>
+                </a:solidFill>
+              </a:rPr>
+              <a:t> a orders </a:t>
+            </a:r>
+            <a:r>
+              <a:rPr lang="en-US" dirty="0" err="1">
+                <a:solidFill>
+                  <a:schemeClr val="bg1"/>
+                </a:solidFill>
+              </a:rPr>
+              <a:t>táblában</a:t>
+            </a:r>
+            <a:r>
+              <a:rPr lang="en-US" dirty="0">
+                <a:solidFill>
+                  <a:schemeClr val="bg1"/>
+                </a:solidFill>
+              </a:rPr>
+              <a:t> </a:t>
+            </a:r>
+            <a:r>
+              <a:rPr lang="en-US" dirty="0" err="1">
+                <a:solidFill>
+                  <a:schemeClr val="bg1"/>
+                </a:solidFill>
+              </a:rPr>
+              <a:t>nyomon</a:t>
+            </a:r>
+            <a:r>
+              <a:rPr lang="en-US" dirty="0">
+                <a:solidFill>
+                  <a:schemeClr val="bg1"/>
+                </a:solidFill>
+              </a:rPr>
+              <a:t> </a:t>
+            </a:r>
+            <a:r>
+              <a:rPr lang="en-US" dirty="0" err="1">
+                <a:solidFill>
+                  <a:schemeClr val="bg1"/>
+                </a:solidFill>
+              </a:rPr>
+              <a:t>követhetik</a:t>
+            </a:r>
+            <a:r>
+              <a:rPr lang="en-US" dirty="0">
+                <a:solidFill>
+                  <a:schemeClr val="bg1"/>
+                </a:solidFill>
+              </a:rPr>
+              <a:t>, </a:t>
+            </a:r>
+            <a:r>
+              <a:rPr lang="en-US" dirty="0" err="1">
+                <a:solidFill>
+                  <a:schemeClr val="bg1"/>
+                </a:solidFill>
+              </a:rPr>
+              <a:t>illetve</a:t>
+            </a:r>
+            <a:r>
+              <a:rPr lang="en-US" dirty="0">
+                <a:solidFill>
+                  <a:schemeClr val="bg1"/>
+                </a:solidFill>
+              </a:rPr>
+              <a:t> </a:t>
+            </a:r>
+            <a:r>
+              <a:rPr lang="en-US" dirty="0" err="1">
+                <a:solidFill>
+                  <a:schemeClr val="bg1"/>
+                </a:solidFill>
+              </a:rPr>
+              <a:t>lemondhatják</a:t>
+            </a:r>
+            <a:r>
+              <a:rPr lang="en-US" dirty="0">
+                <a:solidFill>
+                  <a:schemeClr val="bg1"/>
+                </a:solidFill>
+              </a:rPr>
+              <a:t> </a:t>
+            </a:r>
+            <a:r>
+              <a:rPr lang="en-US" dirty="0" err="1">
+                <a:solidFill>
+                  <a:schemeClr val="bg1"/>
+                </a:solidFill>
+              </a:rPr>
+              <a:t>rendeléseiket</a:t>
+            </a:r>
+            <a:r>
+              <a:rPr lang="en-US" dirty="0">
+                <a:solidFill>
+                  <a:schemeClr val="bg1"/>
+                </a:solidFill>
+              </a:rPr>
+              <a:t>.</a:t>
+            </a:r>
+          </a:p>
+          <a:p>
+            <a:pPr marL="0" indent="0">
+              <a:buNone/>
+            </a:pPr>
+            <a:endParaRPr lang="en-US" dirty="0">
+              <a:solidFill>
+                <a:schemeClr val="bg1"/>
+              </a:solidFill>
+            </a:endParaRPr>
+          </a:p>
+          <a:p>
+            <a:pPr marL="0" indent="0">
+              <a:buNone/>
+            </a:pPr>
+            <a:r>
+              <a:rPr lang="hu-HU" dirty="0">
+                <a:solidFill>
+                  <a:schemeClr val="bg1"/>
+                </a:solidFill>
+              </a:rPr>
+              <a:t>Ez a struktúra biztosítja, hogy a termékek kategória szerinti vagy ID alapú lekérdezéssel töltődjenek be, és minden vásárlói művelet az adatbázisban tárolt kapcsolatok alapján történjen.</a:t>
+            </a:r>
+            <a:endParaRPr lang="en-US" dirty="0">
+              <a:solidFill>
+                <a:schemeClr val="bg1"/>
+              </a:solidFill>
+            </a:endParaRPr>
+          </a:p>
+          <a:p>
+            <a:endParaRPr lang="en-US" dirty="0">
+              <a:solidFill>
+                <a:schemeClr val="bg1"/>
+              </a:solidFill>
+            </a:endParaRPr>
+          </a:p>
+        </p:txBody>
+      </p:sp>
+      <p:pic>
+        <p:nvPicPr>
+          <p:cNvPr id="5" name="Picture 4">
+            <a:extLst>
+              <a:ext uri="{FF2B5EF4-FFF2-40B4-BE49-F238E27FC236}">
+                <a16:creationId xmlns:a16="http://schemas.microsoft.com/office/drawing/2014/main" id="{B7F7AE32-40F0-7884-7293-5AA581F460AE}"/>
+              </a:ext>
+            </a:extLst>
+          </p:cNvPr>
+          <p:cNvPicPr>
+            <a:picLocks noChangeAspect="1"/>
+          </p:cNvPicPr>
+          <p:nvPr/>
+        </p:nvPicPr>
+        <p:blipFill>
+          <a:blip r:embed="rId2"/>
+          <a:stretch>
+            <a:fillRect/>
+          </a:stretch>
+        </p:blipFill>
+        <p:spPr>
+          <a:xfrm>
+            <a:off x="6496008" y="1315908"/>
+            <a:ext cx="5411788" cy="5079219"/>
+          </a:xfrm>
+          <a:prstGeom prst="rect">
+            <a:avLst/>
+          </a:prstGeom>
+        </p:spPr>
+      </p:pic>
+    </p:spTree>
+    <p:extLst>
+      <p:ext uri="{BB962C8B-B14F-4D97-AF65-F5344CB8AC3E}">
+        <p14:creationId xmlns:p14="http://schemas.microsoft.com/office/powerpoint/2010/main" val="216456005"/>
+      </p:ext>
+    </p:extLst>
+  </p:cSld>
+  <p:clrMapOvr>
+    <a:masterClrMapping/>
+  </p:clrMapOvr>
+</p:sld>
+</file>
+
+<file path=ppt/slides/slide11.xml><?xml version="1.0" encoding="utf-8"?>
+<p:sld xmlns:a="http://schemas.openxmlformats.org/drawingml/2006/main" xmlns:r="http://schemas.openxmlformats.org/officeDocument/2006/relationships" xmlns:p="http://schemas.openxmlformats.org/presentationml/2006/main">
+  <p:cSld>
+    <p:spTree>
+      <p:nvGrpSpPr>
+        <p:cNvPr id="1" name=""/>
+        <p:cNvGrpSpPr/>
+        <p:nvPr/>
+      </p:nvGrpSpPr>
+      <p:grpSpPr>
+        <a:xfrm>
+          <a:off x="0" y="0"/>
+          <a:ext cx="0" cy="0"/>
+          <a:chOff x="0" y="0"/>
+          <a:chExt cx="0" cy="0"/>
+        </a:xfrm>
+      </p:grpSpPr>
+      <p:sp>
+        <p:nvSpPr>
+          <p:cNvPr id="2" name="Title 1">
+            <a:extLst>
+              <a:ext uri="{FF2B5EF4-FFF2-40B4-BE49-F238E27FC236}">
+                <a16:creationId xmlns:a16="http://schemas.microsoft.com/office/drawing/2014/main" id="{134CC0C2-1E14-32E6-7A65-4AB620CFC030}"/>
+              </a:ext>
+            </a:extLst>
+          </p:cNvPr>
+          <p:cNvSpPr>
+            <a:spLocks noGrp="1"/>
+          </p:cNvSpPr>
+          <p:nvPr>
+            <p:ph type="title"/>
+          </p:nvPr>
+        </p:nvSpPr>
+        <p:spPr>
+          <a:xfrm>
+            <a:off x="1828800" y="2675466"/>
+            <a:ext cx="8534400" cy="1507067"/>
+          </a:xfrm>
+        </p:spPr>
+        <p:txBody>
+          <a:bodyPr/>
+          <a:lstStyle/>
+          <a:p>
+            <a:pPr algn="ctr"/>
+            <a:r>
+              <a:rPr lang="hu-HU" b="1" i="1" u="sng" dirty="0">
+                <a:solidFill>
+                  <a:schemeClr val="bg1"/>
+                </a:solidFill>
+              </a:rPr>
+              <a:t>KÖSZÖNÖM A FIGYELMET!</a:t>
+            </a:r>
+            <a:endParaRPr lang="en-US" b="1" i="1" u="sng" dirty="0">
+              <a:solidFill>
+                <a:schemeClr val="bg1"/>
+              </a:solidFill>
+            </a:endParaRPr>
+          </a:p>
+        </p:txBody>
+      </p:sp>
+    </p:spTree>
+    <p:extLst>
+      <p:ext uri="{BB962C8B-B14F-4D97-AF65-F5344CB8AC3E}">
+        <p14:creationId xmlns:p14="http://schemas.microsoft.com/office/powerpoint/2010/main" val="2751332633"/>
+      </p:ext>
+    </p:extLst>
+  </p:cSld>
+  <p:clrMapOvr>
+    <a:masterClrMapping/>
+  </p:clrMapOvr>
+</p:sld>
+</file>
+
 <file path=ppt/slides/slide2.xml><?xml version="1.0" encoding="utf-8"?>
 <p:sld xmlns:a="http://schemas.openxmlformats.org/drawingml/2006/main" xmlns:r="http://schemas.openxmlformats.org/officeDocument/2006/relationships" xmlns:p="http://schemas.openxmlformats.org/presentationml/2006/main">
   <p:cSld>
@@ -7317,236 +7822,472 @@
           <a:lstStyle/>
           <a:p>
             <a:r>
-              <a:rPr lang="en-US" dirty="0"/>
+              <a:rPr lang="en-US" dirty="0">
+                <a:solidFill>
+                  <a:schemeClr val="bg1"/>
+                </a:solidFill>
+              </a:rPr>
               <a:t>A products </a:t>
             </a:r>
             <a:r>
-              <a:rPr lang="en-US" dirty="0" err="1"/>
+              <a:rPr lang="en-US" dirty="0" err="1">
+                <a:solidFill>
+                  <a:schemeClr val="bg1"/>
+                </a:solidFill>
+              </a:rPr>
               <a:t>tábla</a:t>
             </a:r>
             <a:r>
-              <a:rPr lang="en-US" dirty="0"/>
+              <a:rPr lang="en-US" dirty="0">
+                <a:solidFill>
+                  <a:schemeClr val="bg1"/>
+                </a:solidFill>
+              </a:rPr>
               <a:t> id </a:t>
             </a:r>
             <a:r>
-              <a:rPr lang="en-US" dirty="0" err="1"/>
+              <a:rPr lang="en-US" dirty="0" err="1">
+                <a:solidFill>
+                  <a:schemeClr val="bg1"/>
+                </a:solidFill>
+              </a:rPr>
               <a:t>mezője</a:t>
             </a:r>
             <a:r>
-              <a:rPr lang="en-US" dirty="0"/>
-              <a:t> </a:t>
-            </a:r>
-            <a:r>
-              <a:rPr lang="en-US" dirty="0" err="1"/>
+              <a:rPr lang="en-US" dirty="0">
+                <a:solidFill>
+                  <a:schemeClr val="bg1"/>
+                </a:solidFill>
+              </a:rPr>
+              <a:t> </a:t>
+            </a:r>
+            <a:r>
+              <a:rPr lang="en-US" dirty="0" err="1">
+                <a:solidFill>
+                  <a:schemeClr val="bg1"/>
+                </a:solidFill>
+              </a:rPr>
               <a:t>összekötve</a:t>
             </a:r>
             <a:r>
-              <a:rPr lang="en-US" dirty="0"/>
+              <a:rPr lang="en-US" dirty="0">
+                <a:solidFill>
+                  <a:schemeClr val="bg1"/>
+                </a:solidFill>
+              </a:rPr>
               <a:t> a cart </a:t>
             </a:r>
             <a:r>
-              <a:rPr lang="en-US" dirty="0" err="1"/>
+              <a:rPr lang="en-US" dirty="0" err="1">
+                <a:solidFill>
+                  <a:schemeClr val="bg1"/>
+                </a:solidFill>
+              </a:rPr>
               <a:t>tábla</a:t>
             </a:r>
             <a:r>
-              <a:rPr lang="en-US" dirty="0"/>
-              <a:t> </a:t>
-            </a:r>
-            <a:r>
-              <a:rPr lang="en-US" dirty="0" err="1"/>
+              <a:rPr lang="en-US" dirty="0">
+                <a:solidFill>
+                  <a:schemeClr val="bg1"/>
+                </a:solidFill>
+              </a:rPr>
+              <a:t> </a:t>
+            </a:r>
+            <a:r>
+              <a:rPr lang="en-US" dirty="0" err="1">
+                <a:solidFill>
+                  <a:schemeClr val="bg1"/>
+                </a:solidFill>
+              </a:rPr>
               <a:t>product_id</a:t>
             </a:r>
             <a:r>
-              <a:rPr lang="en-US" dirty="0"/>
-              <a:t> </a:t>
-            </a:r>
-            <a:r>
-              <a:rPr lang="en-US" dirty="0" err="1"/>
+              <a:rPr lang="en-US" dirty="0">
+                <a:solidFill>
+                  <a:schemeClr val="bg1"/>
+                </a:solidFill>
+              </a:rPr>
+              <a:t> </a:t>
+            </a:r>
+            <a:r>
+              <a:rPr lang="en-US" dirty="0" err="1">
+                <a:solidFill>
+                  <a:schemeClr val="bg1"/>
+                </a:solidFill>
+              </a:rPr>
               <a:t>mezőjével</a:t>
             </a:r>
             <a:r>
-              <a:rPr lang="en-US" dirty="0"/>
+              <a:rPr lang="en-US" dirty="0">
+                <a:solidFill>
+                  <a:schemeClr val="bg1"/>
+                </a:solidFill>
+              </a:rPr>
               <a:t>.</a:t>
             </a:r>
-            <a:endParaRPr lang="hu-HU" dirty="0"/>
-          </a:p>
-          <a:p>
-            <a:r>
-              <a:rPr lang="en-US" dirty="0"/>
+            <a:endParaRPr lang="hu-HU" dirty="0">
+              <a:solidFill>
+                <a:schemeClr val="bg1"/>
+              </a:solidFill>
+            </a:endParaRPr>
+          </a:p>
+          <a:p>
+            <a:r>
+              <a:rPr lang="en-US" dirty="0">
+                <a:solidFill>
+                  <a:schemeClr val="bg1"/>
+                </a:solidFill>
+              </a:rPr>
               <a:t>A users </a:t>
             </a:r>
             <a:r>
-              <a:rPr lang="en-US" dirty="0" err="1"/>
+              <a:rPr lang="en-US" dirty="0" err="1">
+                <a:solidFill>
+                  <a:schemeClr val="bg1"/>
+                </a:solidFill>
+              </a:rPr>
               <a:t>tábla</a:t>
             </a:r>
             <a:r>
-              <a:rPr lang="en-US" dirty="0"/>
+              <a:rPr lang="en-US" dirty="0">
+                <a:solidFill>
+                  <a:schemeClr val="bg1"/>
+                </a:solidFill>
+              </a:rPr>
               <a:t> id </a:t>
             </a:r>
             <a:r>
-              <a:rPr lang="en-US" dirty="0" err="1"/>
+              <a:rPr lang="en-US" dirty="0" err="1">
+                <a:solidFill>
+                  <a:schemeClr val="bg1"/>
+                </a:solidFill>
+              </a:rPr>
               <a:t>mezője</a:t>
             </a:r>
             <a:r>
-              <a:rPr lang="en-US" dirty="0"/>
-              <a:t> </a:t>
-            </a:r>
-            <a:r>
-              <a:rPr lang="en-US" dirty="0" err="1"/>
+              <a:rPr lang="en-US" dirty="0">
+                <a:solidFill>
+                  <a:schemeClr val="bg1"/>
+                </a:solidFill>
+              </a:rPr>
+              <a:t> </a:t>
+            </a:r>
+            <a:r>
+              <a:rPr lang="en-US" dirty="0" err="1">
+                <a:solidFill>
+                  <a:schemeClr val="bg1"/>
+                </a:solidFill>
+              </a:rPr>
               <a:t>összekötve</a:t>
             </a:r>
             <a:r>
-              <a:rPr lang="en-US" dirty="0"/>
+              <a:rPr lang="en-US" dirty="0">
+                <a:solidFill>
+                  <a:schemeClr val="bg1"/>
+                </a:solidFill>
+              </a:rPr>
               <a:t> a cart </a:t>
             </a:r>
             <a:r>
-              <a:rPr lang="en-US" dirty="0" err="1"/>
+              <a:rPr lang="en-US" dirty="0" err="1">
+                <a:solidFill>
+                  <a:schemeClr val="bg1"/>
+                </a:solidFill>
+              </a:rPr>
               <a:t>tábla</a:t>
             </a:r>
             <a:r>
-              <a:rPr lang="en-US" dirty="0"/>
-              <a:t> </a:t>
-            </a:r>
-            <a:r>
-              <a:rPr lang="en-US" dirty="0" err="1"/>
+              <a:rPr lang="en-US" dirty="0">
+                <a:solidFill>
+                  <a:schemeClr val="bg1"/>
+                </a:solidFill>
+              </a:rPr>
+              <a:t> </a:t>
+            </a:r>
+            <a:r>
+              <a:rPr lang="en-US" dirty="0" err="1">
+                <a:solidFill>
+                  <a:schemeClr val="bg1"/>
+                </a:solidFill>
+              </a:rPr>
               <a:t>user_id</a:t>
             </a:r>
             <a:r>
-              <a:rPr lang="en-US" dirty="0"/>
-              <a:t> </a:t>
-            </a:r>
-            <a:r>
-              <a:rPr lang="en-US" dirty="0" err="1"/>
+              <a:rPr lang="en-US" dirty="0">
+                <a:solidFill>
+                  <a:schemeClr val="bg1"/>
+                </a:solidFill>
+              </a:rPr>
+              <a:t> </a:t>
+            </a:r>
+            <a:r>
+              <a:rPr lang="en-US" dirty="0" err="1">
+                <a:solidFill>
+                  <a:schemeClr val="bg1"/>
+                </a:solidFill>
+              </a:rPr>
               <a:t>mezőjével</a:t>
             </a:r>
             <a:r>
-              <a:rPr lang="en-US" dirty="0"/>
+              <a:rPr lang="en-US" dirty="0">
+                <a:solidFill>
+                  <a:schemeClr val="bg1"/>
+                </a:solidFill>
+              </a:rPr>
               <a:t>.</a:t>
             </a:r>
-            <a:endParaRPr lang="hu-HU" dirty="0"/>
-          </a:p>
-          <a:p>
-            <a:r>
-              <a:rPr lang="en-US" dirty="0"/>
+            <a:endParaRPr lang="hu-HU" dirty="0">
+              <a:solidFill>
+                <a:schemeClr val="bg1"/>
+              </a:solidFill>
+            </a:endParaRPr>
+          </a:p>
+          <a:p>
+            <a:r>
+              <a:rPr lang="en-US" dirty="0">
+                <a:solidFill>
+                  <a:schemeClr val="bg1"/>
+                </a:solidFill>
+              </a:rPr>
               <a:t>Az orders </a:t>
             </a:r>
             <a:r>
-              <a:rPr lang="en-US" dirty="0" err="1"/>
+              <a:rPr lang="en-US" dirty="0" err="1">
+                <a:solidFill>
+                  <a:schemeClr val="bg1"/>
+                </a:solidFill>
+              </a:rPr>
               <a:t>tábla</a:t>
             </a:r>
             <a:r>
-              <a:rPr lang="en-US" dirty="0"/>
+              <a:rPr lang="en-US" dirty="0">
+                <a:solidFill>
+                  <a:schemeClr val="bg1"/>
+                </a:solidFill>
+              </a:rPr>
               <a:t> id </a:t>
             </a:r>
             <a:r>
-              <a:rPr lang="en-US" dirty="0" err="1"/>
+              <a:rPr lang="en-US" dirty="0" err="1">
+                <a:solidFill>
+                  <a:schemeClr val="bg1"/>
+                </a:solidFill>
+              </a:rPr>
               <a:t>mezője</a:t>
             </a:r>
             <a:r>
-              <a:rPr lang="en-US" dirty="0"/>
-              <a:t> </a:t>
-            </a:r>
-            <a:r>
-              <a:rPr lang="en-US" dirty="0" err="1"/>
+              <a:rPr lang="en-US" dirty="0">
+                <a:solidFill>
+                  <a:schemeClr val="bg1"/>
+                </a:solidFill>
+              </a:rPr>
+              <a:t> </a:t>
+            </a:r>
+            <a:r>
+              <a:rPr lang="en-US" dirty="0" err="1">
+                <a:solidFill>
+                  <a:schemeClr val="bg1"/>
+                </a:solidFill>
+              </a:rPr>
               <a:t>összekötve</a:t>
             </a:r>
             <a:r>
-              <a:rPr lang="en-US" dirty="0"/>
+              <a:rPr lang="en-US" dirty="0">
+                <a:solidFill>
+                  <a:schemeClr val="bg1"/>
+                </a:solidFill>
+              </a:rPr>
               <a:t> a cart </a:t>
             </a:r>
             <a:r>
-              <a:rPr lang="en-US" dirty="0" err="1"/>
+              <a:rPr lang="en-US" dirty="0" err="1">
+                <a:solidFill>
+                  <a:schemeClr val="bg1"/>
+                </a:solidFill>
+              </a:rPr>
               <a:t>tábla</a:t>
             </a:r>
             <a:r>
-              <a:rPr lang="en-US" dirty="0"/>
-              <a:t> </a:t>
-            </a:r>
-            <a:r>
-              <a:rPr lang="en-US" dirty="0" err="1"/>
+              <a:rPr lang="en-US" dirty="0">
+                <a:solidFill>
+                  <a:schemeClr val="bg1"/>
+                </a:solidFill>
+              </a:rPr>
+              <a:t> </a:t>
+            </a:r>
+            <a:r>
+              <a:rPr lang="en-US" dirty="0" err="1">
+                <a:solidFill>
+                  <a:schemeClr val="bg1"/>
+                </a:solidFill>
+              </a:rPr>
               <a:t>order_id</a:t>
             </a:r>
             <a:r>
-              <a:rPr lang="en-US" dirty="0"/>
-              <a:t> </a:t>
-            </a:r>
-            <a:r>
-              <a:rPr lang="en-US" dirty="0" err="1"/>
+              <a:rPr lang="en-US" dirty="0">
+                <a:solidFill>
+                  <a:schemeClr val="bg1"/>
+                </a:solidFill>
+              </a:rPr>
+              <a:t> </a:t>
+            </a:r>
+            <a:r>
+              <a:rPr lang="en-US" dirty="0" err="1">
+                <a:solidFill>
+                  <a:schemeClr val="bg1"/>
+                </a:solidFill>
+              </a:rPr>
               <a:t>mezőjével</a:t>
             </a:r>
             <a:r>
-              <a:rPr lang="en-US" dirty="0"/>
+              <a:rPr lang="en-US" dirty="0">
+                <a:solidFill>
+                  <a:schemeClr val="bg1"/>
+                </a:solidFill>
+              </a:rPr>
               <a:t>.</a:t>
             </a:r>
-            <a:endParaRPr lang="hu-HU" dirty="0"/>
-          </a:p>
-          <a:p>
-            <a:r>
-              <a:rPr lang="en-US" dirty="0"/>
+            <a:endParaRPr lang="hu-HU" dirty="0">
+              <a:solidFill>
+                <a:schemeClr val="bg1"/>
+              </a:solidFill>
+            </a:endParaRPr>
+          </a:p>
+          <a:p>
+            <a:r>
+              <a:rPr lang="en-US" dirty="0">
+                <a:solidFill>
+                  <a:schemeClr val="bg1"/>
+                </a:solidFill>
+              </a:rPr>
               <a:t>Az orders </a:t>
             </a:r>
             <a:r>
-              <a:rPr lang="en-US" dirty="0" err="1"/>
+              <a:rPr lang="en-US" dirty="0" err="1">
+                <a:solidFill>
+                  <a:schemeClr val="bg1"/>
+                </a:solidFill>
+              </a:rPr>
               <a:t>tábla</a:t>
             </a:r>
             <a:r>
-              <a:rPr lang="en-US" dirty="0"/>
+              <a:rPr lang="en-US" dirty="0">
+                <a:solidFill>
+                  <a:schemeClr val="bg1"/>
+                </a:solidFill>
+              </a:rPr>
               <a:t> id </a:t>
             </a:r>
             <a:r>
-              <a:rPr lang="en-US" dirty="0" err="1"/>
+              <a:rPr lang="en-US" dirty="0" err="1">
+                <a:solidFill>
+                  <a:schemeClr val="bg1"/>
+                </a:solidFill>
+              </a:rPr>
               <a:t>mezője</a:t>
             </a:r>
             <a:r>
-              <a:rPr lang="en-US" dirty="0"/>
-              <a:t> </a:t>
-            </a:r>
-            <a:r>
-              <a:rPr lang="en-US" dirty="0" err="1"/>
+              <a:rPr lang="en-US" dirty="0">
+                <a:solidFill>
+                  <a:schemeClr val="bg1"/>
+                </a:solidFill>
+              </a:rPr>
+              <a:t> </a:t>
+            </a:r>
+            <a:r>
+              <a:rPr lang="en-US" dirty="0" err="1">
+                <a:solidFill>
+                  <a:schemeClr val="bg1"/>
+                </a:solidFill>
+              </a:rPr>
               <a:t>összekötve</a:t>
             </a:r>
             <a:r>
-              <a:rPr lang="en-US" dirty="0"/>
-              <a:t> </a:t>
-            </a:r>
-            <a:r>
-              <a:rPr lang="en-US" dirty="0" err="1"/>
+              <a:rPr lang="en-US" dirty="0">
+                <a:solidFill>
+                  <a:schemeClr val="bg1"/>
+                </a:solidFill>
+              </a:rPr>
+              <a:t> </a:t>
+            </a:r>
+            <a:r>
+              <a:rPr lang="en-US" dirty="0" err="1">
+                <a:solidFill>
+                  <a:schemeClr val="bg1"/>
+                </a:solidFill>
+              </a:rPr>
               <a:t>az</a:t>
             </a:r>
             <a:r>
-              <a:rPr lang="en-US" dirty="0"/>
-              <a:t> </a:t>
-            </a:r>
-            <a:r>
-              <a:rPr lang="en-US" dirty="0" err="1"/>
+              <a:rPr lang="en-US" dirty="0">
+                <a:solidFill>
+                  <a:schemeClr val="bg1"/>
+                </a:solidFill>
+              </a:rPr>
+              <a:t> </a:t>
+            </a:r>
+            <a:r>
+              <a:rPr lang="en-US" dirty="0" err="1">
+                <a:solidFill>
+                  <a:schemeClr val="bg1"/>
+                </a:solidFill>
+              </a:rPr>
               <a:t>orders_items</a:t>
             </a:r>
             <a:r>
-              <a:rPr lang="en-US" dirty="0"/>
-              <a:t> </a:t>
-            </a:r>
-            <a:r>
-              <a:rPr lang="en-US" dirty="0" err="1"/>
+              <a:rPr lang="en-US" dirty="0">
+                <a:solidFill>
+                  <a:schemeClr val="bg1"/>
+                </a:solidFill>
+              </a:rPr>
+              <a:t> </a:t>
+            </a:r>
+            <a:r>
+              <a:rPr lang="en-US" dirty="0" err="1">
+                <a:solidFill>
+                  <a:schemeClr val="bg1"/>
+                </a:solidFill>
+              </a:rPr>
               <a:t>tábla</a:t>
             </a:r>
             <a:r>
-              <a:rPr lang="en-US" dirty="0"/>
-              <a:t> </a:t>
-            </a:r>
-            <a:r>
-              <a:rPr lang="en-US" dirty="0" err="1"/>
+              <a:rPr lang="en-US" dirty="0">
+                <a:solidFill>
+                  <a:schemeClr val="bg1"/>
+                </a:solidFill>
+              </a:rPr>
+              <a:t> </a:t>
+            </a:r>
+            <a:r>
+              <a:rPr lang="en-US" dirty="0" err="1">
+                <a:solidFill>
+                  <a:schemeClr val="bg1"/>
+                </a:solidFill>
+              </a:rPr>
               <a:t>order_id</a:t>
             </a:r>
             <a:r>
-              <a:rPr lang="en-US" dirty="0"/>
-              <a:t> </a:t>
-            </a:r>
-            <a:r>
-              <a:rPr lang="en-US" dirty="0" err="1"/>
+              <a:rPr lang="en-US" dirty="0">
+                <a:solidFill>
+                  <a:schemeClr val="bg1"/>
+                </a:solidFill>
+              </a:rPr>
+              <a:t> </a:t>
+            </a:r>
+            <a:r>
+              <a:rPr lang="en-US" dirty="0" err="1">
+                <a:solidFill>
+                  <a:schemeClr val="bg1"/>
+                </a:solidFill>
+              </a:rPr>
               <a:t>mezőjével</a:t>
             </a:r>
             <a:r>
-              <a:rPr lang="en-US" dirty="0"/>
+              <a:rPr lang="en-US" dirty="0">
+                <a:solidFill>
+                  <a:schemeClr val="bg1"/>
+                </a:solidFill>
+              </a:rPr>
               <a:t>.</a:t>
             </a:r>
           </a:p>
@@ -7664,38 +8405,62 @@
         </p:nvSpPr>
         <p:spPr>
           <a:xfrm>
-            <a:off x="241152" y="914399"/>
-            <a:ext cx="11709696" cy="5731497"/>
+            <a:off x="241153" y="914399"/>
+            <a:ext cx="4293140" cy="5943601"/>
           </a:xfrm>
         </p:spPr>
         <p:txBody>
           <a:bodyPr>
-            <a:normAutofit fontScale="92500" lnSpcReduction="10000"/>
+            <a:normAutofit/>
           </a:bodyPr>
           <a:lstStyle/>
           <a:p>
             <a:r>
-              <a:rPr lang="en-US" dirty="0" err="1"/>
+              <a:rPr lang="en-US" dirty="0" err="1">
+                <a:solidFill>
+                  <a:schemeClr val="bg1"/>
+                </a:solidFill>
+              </a:rPr>
               <a:t>Regisztráció</a:t>
             </a:r>
             <a:r>
-              <a:rPr lang="en-US" dirty="0"/>
-              <a:t> </a:t>
-            </a:r>
-            <a:r>
-              <a:rPr lang="en-US" dirty="0" err="1"/>
+              <a:rPr lang="en-US" dirty="0">
+                <a:solidFill>
+                  <a:schemeClr val="bg1"/>
+                </a:solidFill>
+              </a:rPr>
+              <a:t> </a:t>
+            </a:r>
+            <a:r>
+              <a:rPr lang="en-US" dirty="0" err="1">
+                <a:solidFill>
+                  <a:schemeClr val="bg1"/>
+                </a:solidFill>
+              </a:rPr>
               <a:t>és</a:t>
             </a:r>
             <a:r>
-              <a:rPr lang="en-US" dirty="0"/>
-              <a:t> </a:t>
-            </a:r>
-            <a:r>
-              <a:rPr lang="en-US" dirty="0" err="1"/>
+              <a:rPr lang="en-US" dirty="0">
+                <a:solidFill>
+                  <a:schemeClr val="bg1"/>
+                </a:solidFill>
+              </a:rPr>
+              <a:t> </a:t>
+            </a:r>
+            <a:r>
+              <a:rPr lang="en-US" dirty="0" err="1">
+                <a:solidFill>
+                  <a:schemeClr val="bg1"/>
+                </a:solidFill>
+              </a:rPr>
               <a:t>bejelentkezés</a:t>
             </a:r>
             <a:r>
-              <a:rPr lang="en-US" dirty="0"/>
+              <a:rPr lang="en-US" dirty="0">
+                <a:solidFill>
+                  <a:schemeClr val="bg1"/>
+                </a:solidFill>
+              </a:rPr>
               <a:t>: </a:t>
             </a:r>
           </a:p>
@@ -7703,150 +8468,294 @@
             <a:pPr marL="0" indent="0">
               <a:buNone/>
             </a:pPr>
-            <a:endParaRPr lang="en-US" dirty="0"/>
+            <a:endParaRPr lang="en-US" dirty="0">
+              <a:solidFill>
+                <a:schemeClr val="bg1"/>
+              </a:solidFill>
+            </a:endParaRPr>
           </a:p>
           <a:p>
             <a:pPr marL="0" indent="0">
               <a:buNone/>
             </a:pPr>
             <a:r>
-              <a:rPr lang="en-US" dirty="0"/>
+              <a:rPr lang="en-US" dirty="0">
+                <a:solidFill>
+                  <a:schemeClr val="bg1"/>
+                </a:solidFill>
+              </a:rPr>
               <a:t>A </a:t>
             </a:r>
             <a:r>
-              <a:rPr lang="en-US" dirty="0" err="1"/>
+              <a:rPr lang="en-US" dirty="0" err="1">
+                <a:solidFill>
+                  <a:schemeClr val="bg1"/>
+                </a:solidFill>
+              </a:rPr>
               <a:t>felhasználók</a:t>
             </a:r>
             <a:r>
-              <a:rPr lang="en-US" dirty="0"/>
-              <a:t> </a:t>
-            </a:r>
-            <a:r>
-              <a:rPr lang="en-US" dirty="0" err="1"/>
+              <a:rPr lang="en-US" dirty="0">
+                <a:solidFill>
+                  <a:schemeClr val="bg1"/>
+                </a:solidFill>
+              </a:rPr>
+              <a:t> </a:t>
+            </a:r>
+            <a:r>
+              <a:rPr lang="en-US" dirty="0" err="1">
+                <a:solidFill>
+                  <a:schemeClr val="bg1"/>
+                </a:solidFill>
+              </a:rPr>
               <a:t>regisztrációs</a:t>
             </a:r>
             <a:r>
-              <a:rPr lang="en-US" dirty="0"/>
-              <a:t> </a:t>
-            </a:r>
-            <a:r>
-              <a:rPr lang="en-US" dirty="0" err="1"/>
+              <a:rPr lang="en-US" dirty="0">
+                <a:solidFill>
+                  <a:schemeClr val="bg1"/>
+                </a:solidFill>
+              </a:rPr>
+              <a:t> </a:t>
+            </a:r>
+            <a:r>
+              <a:rPr lang="en-US" dirty="0" err="1">
+                <a:solidFill>
+                  <a:schemeClr val="bg1"/>
+                </a:solidFill>
+              </a:rPr>
               <a:t>adatokat</a:t>
             </a:r>
             <a:r>
-              <a:rPr lang="en-US" dirty="0"/>
+              <a:rPr lang="en-US" dirty="0">
+                <a:solidFill>
+                  <a:schemeClr val="bg1"/>
+                </a:solidFill>
+              </a:rPr>
               <a:t> (</a:t>
             </a:r>
             <a:r>
-              <a:rPr lang="en-US" dirty="0" err="1"/>
+              <a:rPr lang="en-US" dirty="0" err="1">
+                <a:solidFill>
+                  <a:schemeClr val="bg1"/>
+                </a:solidFill>
+              </a:rPr>
               <a:t>név</a:t>
             </a:r>
             <a:r>
-              <a:rPr lang="en-US" dirty="0"/>
+              <a:rPr lang="en-US" dirty="0">
+                <a:solidFill>
+                  <a:schemeClr val="bg1"/>
+                </a:solidFill>
+              </a:rPr>
               <a:t>, e-mail, </a:t>
             </a:r>
             <a:r>
-              <a:rPr lang="en-US" dirty="0" err="1"/>
+              <a:rPr lang="en-US" dirty="0" err="1">
+                <a:solidFill>
+                  <a:schemeClr val="bg1"/>
+                </a:solidFill>
+              </a:rPr>
               <a:t>jelszó</a:t>
             </a:r>
             <a:r>
-              <a:rPr lang="en-US" dirty="0"/>
+              <a:rPr lang="en-US" dirty="0">
+                <a:solidFill>
+                  <a:schemeClr val="bg1"/>
+                </a:solidFill>
+              </a:rPr>
               <a:t>) </a:t>
             </a:r>
             <a:r>
-              <a:rPr lang="en-US" dirty="0" err="1"/>
+              <a:rPr lang="en-US" dirty="0" err="1">
+                <a:solidFill>
+                  <a:schemeClr val="bg1"/>
+                </a:solidFill>
+              </a:rPr>
               <a:t>adnak</a:t>
             </a:r>
             <a:r>
-              <a:rPr lang="en-US" dirty="0"/>
+              <a:rPr lang="en-US" dirty="0">
+                <a:solidFill>
+                  <a:schemeClr val="bg1"/>
+                </a:solidFill>
+              </a:rPr>
               <a:t> meg, </a:t>
             </a:r>
             <a:r>
-              <a:rPr lang="en-US" dirty="0" err="1"/>
+              <a:rPr lang="en-US" dirty="0" err="1">
+                <a:solidFill>
+                  <a:schemeClr val="bg1"/>
+                </a:solidFill>
+              </a:rPr>
               <a:t>amelyek</a:t>
             </a:r>
             <a:r>
-              <a:rPr lang="en-US" dirty="0"/>
-              <a:t> </a:t>
-            </a:r>
-            <a:r>
-              <a:rPr lang="en-US" dirty="0" err="1"/>
+              <a:rPr lang="en-US" dirty="0">
+                <a:solidFill>
+                  <a:schemeClr val="bg1"/>
+                </a:solidFill>
+              </a:rPr>
+              <a:t> </a:t>
+            </a:r>
+            <a:r>
+              <a:rPr lang="en-US" dirty="0" err="1">
+                <a:solidFill>
+                  <a:schemeClr val="bg1"/>
+                </a:solidFill>
+              </a:rPr>
               <a:t>az</a:t>
             </a:r>
             <a:r>
-              <a:rPr lang="en-US" dirty="0"/>
+              <a:rPr lang="en-US" dirty="0">
+                <a:solidFill>
+                  <a:schemeClr val="bg1"/>
+                </a:solidFill>
+              </a:rPr>
               <a:t> users </a:t>
             </a:r>
             <a:r>
-              <a:rPr lang="en-US" dirty="0" err="1"/>
+              <a:rPr lang="en-US" dirty="0" err="1">
+                <a:solidFill>
+                  <a:schemeClr val="bg1"/>
+                </a:solidFill>
+              </a:rPr>
               <a:t>táblában</a:t>
             </a:r>
             <a:r>
-              <a:rPr lang="en-US" dirty="0"/>
-              <a:t> </a:t>
-            </a:r>
-            <a:r>
-              <a:rPr lang="en-US" dirty="0" err="1"/>
+              <a:rPr lang="en-US" dirty="0">
+                <a:solidFill>
+                  <a:schemeClr val="bg1"/>
+                </a:solidFill>
+              </a:rPr>
+              <a:t> </a:t>
+            </a:r>
+            <a:r>
+              <a:rPr lang="en-US" dirty="0" err="1">
+                <a:solidFill>
+                  <a:schemeClr val="bg1"/>
+                </a:solidFill>
+              </a:rPr>
               <a:t>tárolódnak</a:t>
             </a:r>
             <a:r>
-              <a:rPr lang="en-US" dirty="0"/>
+              <a:rPr lang="en-US" dirty="0">
+                <a:solidFill>
+                  <a:schemeClr val="bg1"/>
+                </a:solidFill>
+              </a:rPr>
               <a:t>. A </a:t>
             </a:r>
             <a:r>
-              <a:rPr lang="en-US" dirty="0" err="1"/>
+              <a:rPr lang="en-US" dirty="0" err="1">
+                <a:solidFill>
+                  <a:schemeClr val="bg1"/>
+                </a:solidFill>
+              </a:rPr>
               <a:t>sikeres</a:t>
             </a:r>
             <a:r>
-              <a:rPr lang="en-US" dirty="0"/>
-              <a:t> </a:t>
-            </a:r>
-            <a:r>
-              <a:rPr lang="en-US" dirty="0" err="1"/>
+              <a:rPr lang="en-US" dirty="0">
+                <a:solidFill>
+                  <a:schemeClr val="bg1"/>
+                </a:solidFill>
+              </a:rPr>
+              <a:t> </a:t>
+            </a:r>
+            <a:r>
+              <a:rPr lang="en-US" dirty="0" err="1">
+                <a:solidFill>
+                  <a:schemeClr val="bg1"/>
+                </a:solidFill>
+              </a:rPr>
               <a:t>bejelentkezést</a:t>
             </a:r>
             <a:r>
-              <a:rPr lang="en-US" dirty="0"/>
-              <a:t> </a:t>
-            </a:r>
-            <a:r>
-              <a:rPr lang="en-US" dirty="0" err="1"/>
+              <a:rPr lang="en-US" dirty="0">
+                <a:solidFill>
+                  <a:schemeClr val="bg1"/>
+                </a:solidFill>
+              </a:rPr>
+              <a:t> </a:t>
+            </a:r>
+            <a:r>
+              <a:rPr lang="en-US" dirty="0" err="1">
+                <a:solidFill>
+                  <a:schemeClr val="bg1"/>
+                </a:solidFill>
+              </a:rPr>
               <a:t>követően</a:t>
             </a:r>
             <a:r>
-              <a:rPr lang="en-US" dirty="0"/>
+              <a:rPr lang="en-US" dirty="0">
+                <a:solidFill>
+                  <a:schemeClr val="bg1"/>
+                </a:solidFill>
+              </a:rPr>
               <a:t> a </a:t>
             </a:r>
             <a:r>
-              <a:rPr lang="en-US" dirty="0" err="1"/>
+              <a:rPr lang="en-US" dirty="0" err="1">
+                <a:solidFill>
+                  <a:schemeClr val="bg1"/>
+                </a:solidFill>
+              </a:rPr>
               <a:t>felhasználói</a:t>
             </a:r>
             <a:r>
-              <a:rPr lang="en-US" dirty="0"/>
-              <a:t> </a:t>
-            </a:r>
-            <a:r>
-              <a:rPr lang="en-US" dirty="0" err="1"/>
+              <a:rPr lang="en-US" dirty="0">
+                <a:solidFill>
+                  <a:schemeClr val="bg1"/>
+                </a:solidFill>
+              </a:rPr>
+              <a:t> </a:t>
+            </a:r>
+            <a:r>
+              <a:rPr lang="en-US" dirty="0" err="1">
+                <a:solidFill>
+                  <a:schemeClr val="bg1"/>
+                </a:solidFill>
+              </a:rPr>
               <a:t>információkat</a:t>
             </a:r>
             <a:r>
-              <a:rPr lang="en-US" dirty="0"/>
+              <a:rPr lang="en-US" dirty="0">
+                <a:solidFill>
+                  <a:schemeClr val="bg1"/>
+                </a:solidFill>
+              </a:rPr>
               <a:t> session </a:t>
             </a:r>
             <a:r>
-              <a:rPr lang="en-US" dirty="0" err="1"/>
+              <a:rPr lang="en-US" dirty="0" err="1">
+                <a:solidFill>
+                  <a:schemeClr val="bg1"/>
+                </a:solidFill>
+              </a:rPr>
               <a:t>változóban</a:t>
             </a:r>
             <a:r>
-              <a:rPr lang="en-US" dirty="0"/>
-              <a:t> </a:t>
-            </a:r>
-            <a:r>
-              <a:rPr lang="en-US" dirty="0" err="1"/>
+              <a:rPr lang="en-US" dirty="0">
+                <a:solidFill>
+                  <a:schemeClr val="bg1"/>
+                </a:solidFill>
+              </a:rPr>
+              <a:t> </a:t>
+            </a:r>
+            <a:r>
+              <a:rPr lang="en-US" dirty="0" err="1">
+                <a:solidFill>
+                  <a:schemeClr val="bg1"/>
+                </a:solidFill>
+              </a:rPr>
               <a:t>tároljuk</a:t>
             </a:r>
             <a:r>
-              <a:rPr lang="en-US" dirty="0"/>
+              <a:rPr lang="en-US" dirty="0">
+                <a:solidFill>
+                  <a:schemeClr val="bg1"/>
+                </a:solidFill>
+              </a:rPr>
               <a:t>.</a:t>
             </a:r>
           </a:p>
@@ -7854,562 +8763,74 @@
             <a:pPr marL="0" indent="0">
               <a:buNone/>
             </a:pPr>
-            <a:endParaRPr lang="en-US" dirty="0"/>
-          </a:p>
-          <a:p>
-            <a:r>
-              <a:rPr lang="en-US" dirty="0" err="1"/>
-              <a:t>Termékek</a:t>
-            </a:r>
-            <a:r>
-              <a:rPr lang="en-US" dirty="0"/>
-              <a:t> </a:t>
-            </a:r>
-            <a:r>
-              <a:rPr lang="en-US" dirty="0" err="1"/>
-              <a:t>kezelése</a:t>
-            </a:r>
-            <a:r>
-              <a:rPr lang="en-US" dirty="0"/>
-              <a:t>:</a:t>
-            </a:r>
-          </a:p>
-          <a:p>
-            <a:pPr marL="0" indent="0">
-              <a:buNone/>
-            </a:pPr>
-            <a:endParaRPr lang="en-US" dirty="0"/>
-          </a:p>
-          <a:p>
-            <a:pPr marL="0" indent="0">
-              <a:buNone/>
-            </a:pPr>
-            <a:r>
-              <a:rPr lang="en-US" dirty="0" err="1"/>
-              <a:t>Kategória</a:t>
-            </a:r>
-            <a:r>
-              <a:rPr lang="en-US" dirty="0"/>
-              <a:t> </a:t>
-            </a:r>
-            <a:r>
-              <a:rPr lang="en-US" dirty="0" err="1"/>
-              <a:t>szerinti</a:t>
-            </a:r>
-            <a:r>
-              <a:rPr lang="en-US" dirty="0"/>
-              <a:t> </a:t>
-            </a:r>
-            <a:r>
-              <a:rPr lang="en-US" dirty="0" err="1"/>
-              <a:t>betöltés</a:t>
-            </a:r>
-            <a:r>
-              <a:rPr lang="en-US" dirty="0"/>
-              <a:t>: </a:t>
-            </a:r>
-            <a:r>
-              <a:rPr lang="en-US" dirty="0" err="1"/>
-              <a:t>Amikor</a:t>
-            </a:r>
-            <a:r>
-              <a:rPr lang="en-US" dirty="0"/>
-              <a:t> a </a:t>
-            </a:r>
-            <a:r>
-              <a:rPr lang="en-US" dirty="0" err="1"/>
-              <a:t>webshop</a:t>
-            </a:r>
-            <a:r>
-              <a:rPr lang="en-US" dirty="0"/>
-              <a:t> </a:t>
-            </a:r>
-            <a:r>
-              <a:rPr lang="en-US" dirty="0" err="1"/>
-              <a:t>egy</a:t>
-            </a:r>
-            <a:r>
-              <a:rPr lang="en-US" dirty="0"/>
-              <a:t> </a:t>
-            </a:r>
-            <a:r>
-              <a:rPr lang="en-US" dirty="0" err="1"/>
-              <a:t>kategóriát</a:t>
-            </a:r>
-            <a:r>
-              <a:rPr lang="en-US" dirty="0"/>
-              <a:t> (</a:t>
-            </a:r>
-            <a:r>
-              <a:rPr lang="en-US" dirty="0" err="1"/>
-              <a:t>például</a:t>
-            </a:r>
-            <a:r>
-              <a:rPr lang="en-US" dirty="0"/>
-              <a:t> </a:t>
-            </a:r>
-            <a:r>
-              <a:rPr lang="en-US" dirty="0" err="1"/>
-              <a:t>mezek</a:t>
-            </a:r>
-            <a:r>
-              <a:rPr lang="en-US" dirty="0"/>
-              <a:t>, </a:t>
-            </a:r>
-            <a:r>
-              <a:rPr lang="en-US" dirty="0" err="1"/>
-              <a:t>cipők</a:t>
-            </a:r>
-            <a:r>
-              <a:rPr lang="en-US" dirty="0"/>
-              <a:t>) </a:t>
-            </a:r>
-            <a:r>
-              <a:rPr lang="en-US" dirty="0" err="1"/>
-              <a:t>jelenít</a:t>
-            </a:r>
-            <a:r>
-              <a:rPr lang="en-US" dirty="0"/>
-              <a:t> meg, a </a:t>
-            </a:r>
-            <a:r>
-              <a:rPr lang="en-US" dirty="0" err="1"/>
-              <a:t>termékek</a:t>
-            </a:r>
-            <a:r>
-              <a:rPr lang="en-US" dirty="0"/>
-              <a:t> a category </a:t>
-            </a:r>
-            <a:r>
-              <a:rPr lang="en-US" dirty="0" err="1"/>
-              <a:t>alapján</a:t>
-            </a:r>
-            <a:r>
-              <a:rPr lang="en-US" dirty="0"/>
-              <a:t> </a:t>
-            </a:r>
-            <a:r>
-              <a:rPr lang="en-US" dirty="0" err="1"/>
-              <a:t>kerülnek</a:t>
-            </a:r>
-            <a:r>
-              <a:rPr lang="en-US" dirty="0"/>
-              <a:t> </a:t>
-            </a:r>
-            <a:r>
-              <a:rPr lang="en-US" dirty="0" err="1"/>
-              <a:t>lekérdezésre</a:t>
-            </a:r>
-            <a:r>
-              <a:rPr lang="en-US" dirty="0"/>
-              <a:t> </a:t>
-            </a:r>
-            <a:r>
-              <a:rPr lang="en-US" dirty="0" err="1"/>
-              <a:t>az</a:t>
-            </a:r>
-            <a:r>
-              <a:rPr lang="en-US" dirty="0"/>
-              <a:t> </a:t>
-            </a:r>
-            <a:r>
-              <a:rPr lang="en-US" dirty="0" err="1"/>
-              <a:t>adatbázisból</a:t>
-            </a:r>
-            <a:r>
-              <a:rPr lang="en-US" dirty="0"/>
-              <a:t>. </a:t>
-            </a:r>
-            <a:r>
-              <a:rPr lang="en-US" dirty="0" err="1"/>
-              <a:t>Ilyenkor</a:t>
-            </a:r>
-            <a:r>
-              <a:rPr lang="en-US" dirty="0"/>
-              <a:t> a Product::</a:t>
-            </a:r>
-            <a:r>
-              <a:rPr lang="en-US" dirty="0" err="1"/>
-              <a:t>getProductsByCategory</a:t>
-            </a:r>
-            <a:r>
-              <a:rPr lang="en-US" dirty="0"/>
-              <a:t>() </a:t>
-            </a:r>
-            <a:r>
-              <a:rPr lang="en-US" dirty="0" err="1"/>
-              <a:t>metódus</a:t>
-            </a:r>
-            <a:r>
-              <a:rPr lang="en-US" dirty="0"/>
-              <a:t> </a:t>
-            </a:r>
-            <a:r>
-              <a:rPr lang="en-US" dirty="0" err="1"/>
-              <a:t>hívásával</a:t>
-            </a:r>
-            <a:r>
-              <a:rPr lang="en-US" dirty="0"/>
-              <a:t> </a:t>
-            </a:r>
-            <a:r>
-              <a:rPr lang="en-US" dirty="0" err="1"/>
-              <a:t>töltődnek</a:t>
-            </a:r>
-            <a:r>
-              <a:rPr lang="en-US" dirty="0"/>
-              <a:t> be a </a:t>
-            </a:r>
-            <a:r>
-              <a:rPr lang="en-US" dirty="0" err="1"/>
-              <a:t>termékek</a:t>
-            </a:r>
-            <a:r>
-              <a:rPr lang="en-US" dirty="0"/>
-              <a:t>, </a:t>
-            </a:r>
-            <a:r>
-              <a:rPr lang="en-US" dirty="0" err="1"/>
-              <a:t>amelyek</a:t>
-            </a:r>
-            <a:r>
-              <a:rPr lang="en-US" dirty="0"/>
-              <a:t> a </a:t>
-            </a:r>
-            <a:r>
-              <a:rPr lang="en-US" dirty="0" err="1"/>
-              <a:t>kategóriától</a:t>
-            </a:r>
-            <a:r>
-              <a:rPr lang="en-US" dirty="0"/>
-              <a:t> </a:t>
-            </a:r>
-            <a:r>
-              <a:rPr lang="en-US" dirty="0" err="1"/>
-              <a:t>függően</a:t>
-            </a:r>
-            <a:r>
-              <a:rPr lang="en-US" dirty="0"/>
-              <a:t> </a:t>
-            </a:r>
-            <a:r>
-              <a:rPr lang="en-US" dirty="0" err="1"/>
-              <a:t>jelennek</a:t>
-            </a:r>
-            <a:r>
-              <a:rPr lang="en-US" dirty="0"/>
-              <a:t> meg </a:t>
-            </a:r>
-            <a:r>
-              <a:rPr lang="en-US" dirty="0" err="1"/>
-              <a:t>az</a:t>
-            </a:r>
-            <a:r>
-              <a:rPr lang="en-US" dirty="0"/>
-              <a:t> </a:t>
-            </a:r>
-            <a:r>
-              <a:rPr lang="en-US" dirty="0" err="1"/>
-              <a:t>oldalon</a:t>
-            </a:r>
-            <a:r>
-              <a:rPr lang="en-US" dirty="0"/>
-              <a:t>.</a:t>
-            </a:r>
-          </a:p>
-          <a:p>
-            <a:pPr marL="0" indent="0">
-              <a:buNone/>
-            </a:pPr>
-            <a:endParaRPr lang="en-US" dirty="0"/>
-          </a:p>
-          <a:p>
-            <a:pPr marL="0" indent="0">
-              <a:buNone/>
-            </a:pPr>
-            <a:r>
-              <a:rPr lang="en-US" dirty="0" err="1"/>
-              <a:t>Termék</a:t>
-            </a:r>
-            <a:r>
-              <a:rPr lang="en-US" dirty="0"/>
-              <a:t> </a:t>
-            </a:r>
-            <a:r>
-              <a:rPr lang="en-US" dirty="0" err="1"/>
-              <a:t>részletek</a:t>
-            </a:r>
-            <a:r>
-              <a:rPr lang="en-US" dirty="0"/>
-              <a:t> </a:t>
-            </a:r>
-            <a:r>
-              <a:rPr lang="en-US" dirty="0" err="1"/>
-              <a:t>szerinti</a:t>
-            </a:r>
-            <a:r>
-              <a:rPr lang="en-US" dirty="0"/>
-              <a:t> </a:t>
-            </a:r>
-            <a:r>
-              <a:rPr lang="en-US" dirty="0" err="1"/>
-              <a:t>betöltés</a:t>
-            </a:r>
-            <a:r>
-              <a:rPr lang="en-US" dirty="0"/>
-              <a:t>: </a:t>
-            </a:r>
-            <a:r>
-              <a:rPr lang="en-US" dirty="0" err="1"/>
-              <a:t>Amikor</a:t>
-            </a:r>
-            <a:r>
-              <a:rPr lang="en-US" dirty="0"/>
-              <a:t> </a:t>
-            </a:r>
-            <a:r>
-              <a:rPr lang="en-US" dirty="0" err="1"/>
-              <a:t>egy</a:t>
-            </a:r>
-            <a:r>
-              <a:rPr lang="en-US" dirty="0"/>
-              <a:t> </a:t>
-            </a:r>
-            <a:r>
-              <a:rPr lang="en-US" dirty="0" err="1"/>
-              <a:t>konkrét</a:t>
-            </a:r>
-            <a:r>
-              <a:rPr lang="en-US" dirty="0"/>
-              <a:t> </a:t>
-            </a:r>
-            <a:r>
-              <a:rPr lang="en-US" dirty="0" err="1"/>
-              <a:t>termék</a:t>
-            </a:r>
-            <a:r>
-              <a:rPr lang="en-US" dirty="0"/>
-              <a:t> </a:t>
-            </a:r>
-            <a:r>
-              <a:rPr lang="en-US" dirty="0" err="1"/>
-              <a:t>részleteit</a:t>
-            </a:r>
-            <a:r>
-              <a:rPr lang="en-US" dirty="0"/>
-              <a:t> </a:t>
-            </a:r>
-            <a:r>
-              <a:rPr lang="en-US" dirty="0" err="1"/>
-              <a:t>szeretnénk</a:t>
-            </a:r>
-            <a:r>
-              <a:rPr lang="en-US" dirty="0"/>
-              <a:t> </a:t>
-            </a:r>
-            <a:r>
-              <a:rPr lang="en-US" dirty="0" err="1"/>
-              <a:t>megjeleníteni</a:t>
-            </a:r>
-            <a:r>
-              <a:rPr lang="en-US" dirty="0"/>
-              <a:t> (</a:t>
-            </a:r>
-            <a:r>
-              <a:rPr lang="en-US" dirty="0" err="1"/>
-              <a:t>például</a:t>
-            </a:r>
-            <a:r>
-              <a:rPr lang="en-US" dirty="0"/>
-              <a:t> a </a:t>
-            </a:r>
-            <a:r>
-              <a:rPr lang="en-US" dirty="0" err="1"/>
-              <a:t>termékoldalon</a:t>
-            </a:r>
-            <a:r>
-              <a:rPr lang="en-US" dirty="0"/>
-              <a:t>), </a:t>
-            </a:r>
-            <a:r>
-              <a:rPr lang="en-US" dirty="0" err="1"/>
-              <a:t>akkor</a:t>
-            </a:r>
-            <a:r>
-              <a:rPr lang="en-US" dirty="0"/>
-              <a:t> a </a:t>
-            </a:r>
-            <a:r>
-              <a:rPr lang="en-US" dirty="0" err="1"/>
-              <a:t>termék</a:t>
-            </a:r>
-            <a:r>
-              <a:rPr lang="en-US" dirty="0"/>
-              <a:t> </a:t>
-            </a:r>
-            <a:r>
-              <a:rPr lang="en-US" dirty="0" err="1"/>
-              <a:t>egyedi</a:t>
-            </a:r>
-            <a:r>
-              <a:rPr lang="en-US" dirty="0"/>
-              <a:t> </a:t>
-            </a:r>
-            <a:r>
-              <a:rPr lang="en-US" dirty="0" err="1"/>
-              <a:t>azonosítóját</a:t>
-            </a:r>
-            <a:r>
-              <a:rPr lang="en-US" dirty="0"/>
-              <a:t> (ID) </a:t>
-            </a:r>
-            <a:r>
-              <a:rPr lang="en-US" dirty="0" err="1"/>
-              <a:t>használjuk</a:t>
-            </a:r>
-            <a:r>
-              <a:rPr lang="en-US" dirty="0"/>
-              <a:t>. Az </a:t>
-            </a:r>
-            <a:r>
-              <a:rPr lang="en-US" dirty="0" err="1"/>
-              <a:t>adatbázisból</a:t>
-            </a:r>
-            <a:r>
-              <a:rPr lang="en-US" dirty="0"/>
-              <a:t> a Product::</a:t>
-            </a:r>
-            <a:r>
-              <a:rPr lang="en-US" dirty="0" err="1"/>
-              <a:t>getProductById</a:t>
-            </a:r>
-            <a:r>
-              <a:rPr lang="en-US" dirty="0"/>
-              <a:t>() </a:t>
-            </a:r>
-            <a:r>
-              <a:rPr lang="en-US" dirty="0" err="1"/>
-              <a:t>metódussal</a:t>
-            </a:r>
-            <a:r>
-              <a:rPr lang="en-US" dirty="0"/>
-              <a:t> </a:t>
-            </a:r>
-            <a:r>
-              <a:rPr lang="en-US" dirty="0" err="1"/>
-              <a:t>töltjük</a:t>
-            </a:r>
-            <a:r>
-              <a:rPr lang="en-US" dirty="0"/>
-              <a:t> le </a:t>
-            </a:r>
-            <a:r>
-              <a:rPr lang="en-US" dirty="0" err="1"/>
-              <a:t>az</a:t>
-            </a:r>
-            <a:r>
-              <a:rPr lang="en-US" dirty="0"/>
-              <a:t> </a:t>
-            </a:r>
-            <a:r>
-              <a:rPr lang="en-US" dirty="0" err="1"/>
-              <a:t>adott</a:t>
-            </a:r>
-            <a:r>
-              <a:rPr lang="en-US" dirty="0"/>
-              <a:t> </a:t>
-            </a:r>
-            <a:r>
-              <a:rPr lang="en-US" dirty="0" err="1"/>
-              <a:t>termék</a:t>
-            </a:r>
-            <a:r>
-              <a:rPr lang="en-US" dirty="0"/>
-              <a:t> </a:t>
-            </a:r>
-            <a:r>
-              <a:rPr lang="en-US" dirty="0" err="1"/>
-              <a:t>adatait</a:t>
-            </a:r>
-            <a:r>
-              <a:rPr lang="en-US" dirty="0"/>
-              <a:t>, </a:t>
-            </a:r>
-            <a:r>
-              <a:rPr lang="en-US" dirty="0" err="1"/>
-              <a:t>így</a:t>
-            </a:r>
-            <a:r>
-              <a:rPr lang="en-US" dirty="0"/>
-              <a:t> </a:t>
-            </a:r>
-            <a:r>
-              <a:rPr lang="en-US" dirty="0" err="1"/>
-              <a:t>jelennek</a:t>
-            </a:r>
-            <a:r>
-              <a:rPr lang="en-US" dirty="0"/>
-              <a:t> meg a </a:t>
-            </a:r>
-            <a:r>
-              <a:rPr lang="en-US" dirty="0" err="1"/>
-              <a:t>részletes</a:t>
-            </a:r>
-            <a:r>
-              <a:rPr lang="en-US" dirty="0"/>
-              <a:t> </a:t>
-            </a:r>
-            <a:r>
-              <a:rPr lang="en-US" dirty="0" err="1"/>
-              <a:t>információk</a:t>
-            </a:r>
-            <a:r>
-              <a:rPr lang="en-US" dirty="0"/>
-              <a:t> (pl. </a:t>
-            </a:r>
-            <a:r>
-              <a:rPr lang="en-US" dirty="0" err="1"/>
-              <a:t>ár</a:t>
-            </a:r>
-            <a:r>
-              <a:rPr lang="en-US" dirty="0"/>
-              <a:t>, </a:t>
-            </a:r>
-            <a:r>
-              <a:rPr lang="en-US" dirty="0" err="1"/>
-              <a:t>leírás</a:t>
-            </a:r>
-            <a:r>
-              <a:rPr lang="en-US" dirty="0"/>
-              <a:t>, </a:t>
-            </a:r>
-            <a:r>
-              <a:rPr lang="en-US" dirty="0" err="1"/>
-              <a:t>kép</a:t>
-            </a:r>
-            <a:r>
-              <a:rPr lang="en-US" dirty="0"/>
-              <a:t>) </a:t>
-            </a:r>
-            <a:r>
-              <a:rPr lang="en-US" dirty="0" err="1"/>
-              <a:t>az</a:t>
-            </a:r>
-            <a:r>
-              <a:rPr lang="en-US" dirty="0"/>
-              <a:t> </a:t>
-            </a:r>
-            <a:r>
-              <a:rPr lang="en-US" dirty="0" err="1"/>
-              <a:t>oldalon</a:t>
-            </a:r>
-            <a:r>
-              <a:rPr lang="en-US" dirty="0"/>
-              <a:t>.</a:t>
-            </a:r>
-          </a:p>
-        </p:txBody>
-      </p:sp>
+            <a:endParaRPr lang="en-US" dirty="0">
+              <a:solidFill>
+                <a:schemeClr val="bg1"/>
+              </a:solidFill>
+            </a:endParaRPr>
+          </a:p>
+        </p:txBody>
+      </p:sp>
+      <p:pic>
+        <p:nvPicPr>
+          <p:cNvPr id="5" name="Picture 4">
+            <a:extLst>
+              <a:ext uri="{FF2B5EF4-FFF2-40B4-BE49-F238E27FC236}">
+                <a16:creationId xmlns:a16="http://schemas.microsoft.com/office/drawing/2014/main" id="{AB3A8ED8-DD7E-8E83-AD58-B99B80CE20BB}"/>
+              </a:ext>
+            </a:extLst>
+          </p:cNvPr>
+          <p:cNvPicPr>
+            <a:picLocks noChangeAspect="1"/>
+          </p:cNvPicPr>
+          <p:nvPr/>
+        </p:nvPicPr>
+        <p:blipFill>
+          <a:blip r:embed="rId2"/>
+          <a:stretch>
+            <a:fillRect/>
+          </a:stretch>
+        </p:blipFill>
+        <p:spPr>
+          <a:xfrm>
+            <a:off x="5052366" y="1713321"/>
+            <a:ext cx="3205113" cy="4345756"/>
+          </a:xfrm>
+          <a:prstGeom prst="rect">
+            <a:avLst/>
+          </a:prstGeom>
+        </p:spPr>
+      </p:pic>
+      <p:pic>
+        <p:nvPicPr>
+          <p:cNvPr id="7" name="Picture 6">
+            <a:extLst>
+              <a:ext uri="{FF2B5EF4-FFF2-40B4-BE49-F238E27FC236}">
+                <a16:creationId xmlns:a16="http://schemas.microsoft.com/office/drawing/2014/main" id="{A4881C87-BC62-B61E-F385-BD63CF73BA70}"/>
+              </a:ext>
+            </a:extLst>
+          </p:cNvPr>
+          <p:cNvPicPr>
+            <a:picLocks noChangeAspect="1"/>
+          </p:cNvPicPr>
+          <p:nvPr/>
+        </p:nvPicPr>
+        <p:blipFill>
+          <a:blip r:embed="rId3"/>
+          <a:stretch>
+            <a:fillRect/>
+          </a:stretch>
+        </p:blipFill>
+        <p:spPr>
+          <a:xfrm>
+            <a:off x="8577991" y="1713321"/>
+            <a:ext cx="3205113" cy="4345756"/>
+          </a:xfrm>
+          <a:prstGeom prst="rect">
+            <a:avLst/>
+          </a:prstGeom>
+        </p:spPr>
+      </p:pic>
     </p:spTree>
     <p:extLst>
       <p:ext uri="{BB962C8B-B14F-4D97-AF65-F5344CB8AC3E}">
@@ -8445,6 +8866,1261 @@
           <p:cNvPr id="2" name="Title 1">
             <a:extLst>
               <a:ext uri="{FF2B5EF4-FFF2-40B4-BE49-F238E27FC236}">
+                <a16:creationId xmlns:a16="http://schemas.microsoft.com/office/drawing/2014/main" id="{8767646A-1AF0-B7DE-237C-22B5549982CA}"/>
+              </a:ext>
+            </a:extLst>
+          </p:cNvPr>
+          <p:cNvSpPr>
+            <a:spLocks noGrp="1"/>
+          </p:cNvSpPr>
+          <p:nvPr>
+            <p:ph type="title"/>
+          </p:nvPr>
+        </p:nvSpPr>
+        <p:spPr>
+          <a:xfrm>
+            <a:off x="410834" y="0"/>
+            <a:ext cx="5176118" cy="869623"/>
+          </a:xfrm>
+        </p:spPr>
+        <p:txBody>
+          <a:bodyPr/>
+          <a:lstStyle/>
+          <a:p>
+            <a:r>
+              <a:rPr lang="hu-HU" dirty="0"/>
+              <a:t>Webshop működése</a:t>
+            </a:r>
+            <a:endParaRPr lang="en-US" dirty="0"/>
+          </a:p>
+        </p:txBody>
+      </p:sp>
+      <p:sp>
+        <p:nvSpPr>
+          <p:cNvPr id="3" name="Content Placeholder 2">
+            <a:extLst>
+              <a:ext uri="{FF2B5EF4-FFF2-40B4-BE49-F238E27FC236}">
+                <a16:creationId xmlns:a16="http://schemas.microsoft.com/office/drawing/2014/main" id="{E1A48388-4867-116B-AF2A-BEA9F4C366C9}"/>
+              </a:ext>
+            </a:extLst>
+          </p:cNvPr>
+          <p:cNvSpPr>
+            <a:spLocks noGrp="1"/>
+          </p:cNvSpPr>
+          <p:nvPr>
+            <p:ph idx="1"/>
+          </p:nvPr>
+        </p:nvSpPr>
+        <p:spPr>
+          <a:xfrm>
+            <a:off x="0" y="1178351"/>
+            <a:ext cx="6046527" cy="5679649"/>
+          </a:xfrm>
+        </p:spPr>
+        <p:txBody>
+          <a:bodyPr>
+            <a:normAutofit fontScale="92500" lnSpcReduction="20000"/>
+          </a:bodyPr>
+          <a:lstStyle/>
+          <a:p>
+            <a:r>
+              <a:rPr lang="en-US" dirty="0" err="1">
+                <a:solidFill>
+                  <a:schemeClr val="bg1"/>
+                </a:solidFill>
+              </a:rPr>
+              <a:t>Termékek</a:t>
+            </a:r>
+            <a:r>
+              <a:rPr lang="en-US" dirty="0">
+                <a:solidFill>
+                  <a:schemeClr val="bg1"/>
+                </a:solidFill>
+              </a:rPr>
+              <a:t> </a:t>
+            </a:r>
+            <a:r>
+              <a:rPr lang="en-US" dirty="0" err="1">
+                <a:solidFill>
+                  <a:schemeClr val="bg1"/>
+                </a:solidFill>
+              </a:rPr>
+              <a:t>kezelése</a:t>
+            </a:r>
+            <a:r>
+              <a:rPr lang="en-US" dirty="0">
+                <a:solidFill>
+                  <a:schemeClr val="bg1"/>
+                </a:solidFill>
+              </a:rPr>
+              <a:t>:</a:t>
+            </a:r>
+          </a:p>
+          <a:p>
+            <a:pPr marL="0" indent="0">
+              <a:buNone/>
+            </a:pPr>
+            <a:endParaRPr lang="en-US" dirty="0">
+              <a:solidFill>
+                <a:schemeClr val="bg1"/>
+              </a:solidFill>
+            </a:endParaRPr>
+          </a:p>
+          <a:p>
+            <a:pPr marL="0" indent="0">
+              <a:buNone/>
+            </a:pPr>
+            <a:r>
+              <a:rPr lang="en-US" dirty="0" err="1">
+                <a:solidFill>
+                  <a:schemeClr val="bg1"/>
+                </a:solidFill>
+              </a:rPr>
+              <a:t>Kategória</a:t>
+            </a:r>
+            <a:r>
+              <a:rPr lang="en-US" dirty="0">
+                <a:solidFill>
+                  <a:schemeClr val="bg1"/>
+                </a:solidFill>
+              </a:rPr>
+              <a:t> </a:t>
+            </a:r>
+            <a:r>
+              <a:rPr lang="en-US" dirty="0" err="1">
+                <a:solidFill>
+                  <a:schemeClr val="bg1"/>
+                </a:solidFill>
+              </a:rPr>
+              <a:t>szerinti</a:t>
+            </a:r>
+            <a:r>
+              <a:rPr lang="en-US" dirty="0">
+                <a:solidFill>
+                  <a:schemeClr val="bg1"/>
+                </a:solidFill>
+              </a:rPr>
+              <a:t> </a:t>
+            </a:r>
+            <a:r>
+              <a:rPr lang="en-US" dirty="0" err="1">
+                <a:solidFill>
+                  <a:schemeClr val="bg1"/>
+                </a:solidFill>
+              </a:rPr>
+              <a:t>betöltés</a:t>
+            </a:r>
+            <a:r>
+              <a:rPr lang="en-US" dirty="0">
+                <a:solidFill>
+                  <a:schemeClr val="bg1"/>
+                </a:solidFill>
+              </a:rPr>
+              <a:t>: </a:t>
+            </a:r>
+          </a:p>
+          <a:p>
+            <a:pPr marL="0" indent="0">
+              <a:buNone/>
+            </a:pPr>
+            <a:r>
+              <a:rPr lang="en-US" dirty="0" err="1">
+                <a:solidFill>
+                  <a:schemeClr val="bg1"/>
+                </a:solidFill>
+              </a:rPr>
+              <a:t>Amikor</a:t>
+            </a:r>
+            <a:r>
+              <a:rPr lang="en-US" dirty="0">
+                <a:solidFill>
+                  <a:schemeClr val="bg1"/>
+                </a:solidFill>
+              </a:rPr>
+              <a:t> a </a:t>
+            </a:r>
+            <a:r>
+              <a:rPr lang="en-US" dirty="0" err="1">
+                <a:solidFill>
+                  <a:schemeClr val="bg1"/>
+                </a:solidFill>
+              </a:rPr>
+              <a:t>webshop</a:t>
+            </a:r>
+            <a:r>
+              <a:rPr lang="en-US" dirty="0">
+                <a:solidFill>
+                  <a:schemeClr val="bg1"/>
+                </a:solidFill>
+              </a:rPr>
+              <a:t> </a:t>
+            </a:r>
+            <a:r>
+              <a:rPr lang="en-US" dirty="0" err="1">
+                <a:solidFill>
+                  <a:schemeClr val="bg1"/>
+                </a:solidFill>
+              </a:rPr>
+              <a:t>egy</a:t>
+            </a:r>
+            <a:r>
+              <a:rPr lang="en-US" dirty="0">
+                <a:solidFill>
+                  <a:schemeClr val="bg1"/>
+                </a:solidFill>
+              </a:rPr>
+              <a:t> </a:t>
+            </a:r>
+            <a:r>
+              <a:rPr lang="en-US" dirty="0" err="1">
+                <a:solidFill>
+                  <a:schemeClr val="bg1"/>
+                </a:solidFill>
+              </a:rPr>
+              <a:t>kategóriát</a:t>
+            </a:r>
+            <a:r>
+              <a:rPr lang="en-US" dirty="0">
+                <a:solidFill>
+                  <a:schemeClr val="bg1"/>
+                </a:solidFill>
+              </a:rPr>
+              <a:t> (</a:t>
+            </a:r>
+            <a:r>
+              <a:rPr lang="en-US" dirty="0" err="1">
+                <a:solidFill>
+                  <a:schemeClr val="bg1"/>
+                </a:solidFill>
+              </a:rPr>
+              <a:t>például</a:t>
+            </a:r>
+            <a:r>
+              <a:rPr lang="en-US" dirty="0">
+                <a:solidFill>
+                  <a:schemeClr val="bg1"/>
+                </a:solidFill>
+              </a:rPr>
+              <a:t> </a:t>
+            </a:r>
+            <a:r>
+              <a:rPr lang="en-US" dirty="0" err="1">
+                <a:solidFill>
+                  <a:schemeClr val="bg1"/>
+                </a:solidFill>
+              </a:rPr>
+              <a:t>mezek</a:t>
+            </a:r>
+            <a:r>
+              <a:rPr lang="en-US" dirty="0">
+                <a:solidFill>
+                  <a:schemeClr val="bg1"/>
+                </a:solidFill>
+              </a:rPr>
+              <a:t>, </a:t>
+            </a:r>
+            <a:r>
+              <a:rPr lang="en-US" dirty="0" err="1">
+                <a:solidFill>
+                  <a:schemeClr val="bg1"/>
+                </a:solidFill>
+              </a:rPr>
+              <a:t>cipők</a:t>
+            </a:r>
+            <a:r>
+              <a:rPr lang="en-US" dirty="0">
+                <a:solidFill>
+                  <a:schemeClr val="bg1"/>
+                </a:solidFill>
+              </a:rPr>
+              <a:t>) </a:t>
+            </a:r>
+            <a:r>
+              <a:rPr lang="en-US" dirty="0" err="1">
+                <a:solidFill>
+                  <a:schemeClr val="bg1"/>
+                </a:solidFill>
+              </a:rPr>
+              <a:t>jelenít</a:t>
+            </a:r>
+            <a:r>
+              <a:rPr lang="en-US" dirty="0">
+                <a:solidFill>
+                  <a:schemeClr val="bg1"/>
+                </a:solidFill>
+              </a:rPr>
+              <a:t> meg, a </a:t>
+            </a:r>
+            <a:r>
+              <a:rPr lang="en-US" dirty="0" err="1">
+                <a:solidFill>
+                  <a:schemeClr val="bg1"/>
+                </a:solidFill>
+              </a:rPr>
+              <a:t>termékek</a:t>
+            </a:r>
+            <a:r>
+              <a:rPr lang="en-US" dirty="0">
+                <a:solidFill>
+                  <a:schemeClr val="bg1"/>
+                </a:solidFill>
+              </a:rPr>
+              <a:t> a category </a:t>
+            </a:r>
+            <a:r>
+              <a:rPr lang="en-US" dirty="0" err="1">
+                <a:solidFill>
+                  <a:schemeClr val="bg1"/>
+                </a:solidFill>
+              </a:rPr>
+              <a:t>alapján</a:t>
+            </a:r>
+            <a:r>
+              <a:rPr lang="en-US" dirty="0">
+                <a:solidFill>
+                  <a:schemeClr val="bg1"/>
+                </a:solidFill>
+              </a:rPr>
+              <a:t> </a:t>
+            </a:r>
+            <a:r>
+              <a:rPr lang="en-US" dirty="0" err="1">
+                <a:solidFill>
+                  <a:schemeClr val="bg1"/>
+                </a:solidFill>
+              </a:rPr>
+              <a:t>kerülnek</a:t>
+            </a:r>
+            <a:r>
+              <a:rPr lang="en-US" dirty="0">
+                <a:solidFill>
+                  <a:schemeClr val="bg1"/>
+                </a:solidFill>
+              </a:rPr>
+              <a:t> </a:t>
+            </a:r>
+            <a:r>
+              <a:rPr lang="en-US" dirty="0" err="1">
+                <a:solidFill>
+                  <a:schemeClr val="bg1"/>
+                </a:solidFill>
+              </a:rPr>
+              <a:t>lekérdezésre</a:t>
+            </a:r>
+            <a:r>
+              <a:rPr lang="en-US" dirty="0">
+                <a:solidFill>
+                  <a:schemeClr val="bg1"/>
+                </a:solidFill>
+              </a:rPr>
+              <a:t> </a:t>
+            </a:r>
+            <a:r>
+              <a:rPr lang="en-US" dirty="0" err="1">
+                <a:solidFill>
+                  <a:schemeClr val="bg1"/>
+                </a:solidFill>
+              </a:rPr>
+              <a:t>az</a:t>
+            </a:r>
+            <a:r>
+              <a:rPr lang="en-US" dirty="0">
+                <a:solidFill>
+                  <a:schemeClr val="bg1"/>
+                </a:solidFill>
+              </a:rPr>
+              <a:t> </a:t>
+            </a:r>
+            <a:r>
+              <a:rPr lang="en-US" dirty="0" err="1">
+                <a:solidFill>
+                  <a:schemeClr val="bg1"/>
+                </a:solidFill>
+              </a:rPr>
+              <a:t>adatbázisból</a:t>
+            </a:r>
+            <a:r>
+              <a:rPr lang="en-US" dirty="0">
+                <a:solidFill>
+                  <a:schemeClr val="bg1"/>
+                </a:solidFill>
+              </a:rPr>
+              <a:t>. </a:t>
+            </a:r>
+            <a:r>
+              <a:rPr lang="en-US" dirty="0" err="1">
+                <a:solidFill>
+                  <a:schemeClr val="bg1"/>
+                </a:solidFill>
+              </a:rPr>
+              <a:t>Ilyenkor</a:t>
+            </a:r>
+            <a:r>
+              <a:rPr lang="en-US" dirty="0">
+                <a:solidFill>
+                  <a:schemeClr val="bg1"/>
+                </a:solidFill>
+              </a:rPr>
+              <a:t> a Product::</a:t>
+            </a:r>
+            <a:r>
+              <a:rPr lang="en-US" dirty="0" err="1">
+                <a:solidFill>
+                  <a:schemeClr val="bg1"/>
+                </a:solidFill>
+              </a:rPr>
+              <a:t>getProductsByCategory</a:t>
+            </a:r>
+            <a:r>
+              <a:rPr lang="en-US" dirty="0">
+                <a:solidFill>
+                  <a:schemeClr val="bg1"/>
+                </a:solidFill>
+              </a:rPr>
+              <a:t>() </a:t>
+            </a:r>
+            <a:r>
+              <a:rPr lang="en-US" dirty="0" err="1">
+                <a:solidFill>
+                  <a:schemeClr val="bg1"/>
+                </a:solidFill>
+              </a:rPr>
+              <a:t>metódus</a:t>
+            </a:r>
+            <a:r>
+              <a:rPr lang="en-US" dirty="0">
+                <a:solidFill>
+                  <a:schemeClr val="bg1"/>
+                </a:solidFill>
+              </a:rPr>
+              <a:t> </a:t>
+            </a:r>
+            <a:r>
+              <a:rPr lang="en-US" dirty="0" err="1">
+                <a:solidFill>
+                  <a:schemeClr val="bg1"/>
+                </a:solidFill>
+              </a:rPr>
+              <a:t>hívásával</a:t>
+            </a:r>
+            <a:r>
+              <a:rPr lang="en-US" dirty="0">
+                <a:solidFill>
+                  <a:schemeClr val="bg1"/>
+                </a:solidFill>
+              </a:rPr>
+              <a:t> </a:t>
+            </a:r>
+            <a:r>
+              <a:rPr lang="en-US" dirty="0" err="1">
+                <a:solidFill>
+                  <a:schemeClr val="bg1"/>
+                </a:solidFill>
+              </a:rPr>
+              <a:t>töltődnek</a:t>
+            </a:r>
+            <a:r>
+              <a:rPr lang="en-US" dirty="0">
+                <a:solidFill>
+                  <a:schemeClr val="bg1"/>
+                </a:solidFill>
+              </a:rPr>
+              <a:t> be a </a:t>
+            </a:r>
+            <a:r>
+              <a:rPr lang="en-US" dirty="0" err="1">
+                <a:solidFill>
+                  <a:schemeClr val="bg1"/>
+                </a:solidFill>
+              </a:rPr>
+              <a:t>termékek</a:t>
+            </a:r>
+            <a:r>
+              <a:rPr lang="en-US" dirty="0">
+                <a:solidFill>
+                  <a:schemeClr val="bg1"/>
+                </a:solidFill>
+              </a:rPr>
+              <a:t>, </a:t>
+            </a:r>
+            <a:r>
+              <a:rPr lang="en-US" dirty="0" err="1">
+                <a:solidFill>
+                  <a:schemeClr val="bg1"/>
+                </a:solidFill>
+              </a:rPr>
+              <a:t>amelyek</a:t>
+            </a:r>
+            <a:r>
+              <a:rPr lang="en-US" dirty="0">
+                <a:solidFill>
+                  <a:schemeClr val="bg1"/>
+                </a:solidFill>
+              </a:rPr>
+              <a:t> a </a:t>
+            </a:r>
+            <a:r>
+              <a:rPr lang="en-US" dirty="0" err="1">
+                <a:solidFill>
+                  <a:schemeClr val="bg1"/>
+                </a:solidFill>
+              </a:rPr>
+              <a:t>kategóriától</a:t>
+            </a:r>
+            <a:r>
+              <a:rPr lang="en-US" dirty="0">
+                <a:solidFill>
+                  <a:schemeClr val="bg1"/>
+                </a:solidFill>
+              </a:rPr>
+              <a:t> </a:t>
+            </a:r>
+            <a:r>
+              <a:rPr lang="en-US" dirty="0" err="1">
+                <a:solidFill>
+                  <a:schemeClr val="bg1"/>
+                </a:solidFill>
+              </a:rPr>
+              <a:t>függően</a:t>
+            </a:r>
+            <a:r>
+              <a:rPr lang="en-US" dirty="0">
+                <a:solidFill>
+                  <a:schemeClr val="bg1"/>
+                </a:solidFill>
+              </a:rPr>
+              <a:t> </a:t>
+            </a:r>
+            <a:r>
+              <a:rPr lang="en-US" dirty="0" err="1">
+                <a:solidFill>
+                  <a:schemeClr val="bg1"/>
+                </a:solidFill>
+              </a:rPr>
+              <a:t>jelennek</a:t>
+            </a:r>
+            <a:r>
+              <a:rPr lang="en-US" dirty="0">
+                <a:solidFill>
+                  <a:schemeClr val="bg1"/>
+                </a:solidFill>
+              </a:rPr>
+              <a:t> meg </a:t>
+            </a:r>
+            <a:r>
+              <a:rPr lang="en-US" dirty="0" err="1">
+                <a:solidFill>
+                  <a:schemeClr val="bg1"/>
+                </a:solidFill>
+              </a:rPr>
+              <a:t>az</a:t>
+            </a:r>
+            <a:r>
+              <a:rPr lang="en-US" dirty="0">
+                <a:solidFill>
+                  <a:schemeClr val="bg1"/>
+                </a:solidFill>
+              </a:rPr>
+              <a:t> </a:t>
+            </a:r>
+            <a:r>
+              <a:rPr lang="en-US" dirty="0" err="1">
+                <a:solidFill>
+                  <a:schemeClr val="bg1"/>
+                </a:solidFill>
+              </a:rPr>
+              <a:t>oldalon</a:t>
+            </a:r>
+            <a:r>
+              <a:rPr lang="en-US" dirty="0">
+                <a:solidFill>
+                  <a:schemeClr val="bg1"/>
+                </a:solidFill>
+              </a:rPr>
+              <a:t>.</a:t>
+            </a:r>
+          </a:p>
+          <a:p>
+            <a:endParaRPr lang="en-US" dirty="0">
+              <a:solidFill>
+                <a:schemeClr val="bg1"/>
+              </a:solidFill>
+            </a:endParaRPr>
+          </a:p>
+          <a:p>
+            <a:pPr marL="0" indent="0">
+              <a:buNone/>
+            </a:pPr>
+            <a:r>
+              <a:rPr lang="en-US" dirty="0" err="1">
+                <a:solidFill>
+                  <a:schemeClr val="bg1"/>
+                </a:solidFill>
+              </a:rPr>
+              <a:t>Termék</a:t>
+            </a:r>
+            <a:r>
+              <a:rPr lang="en-US" dirty="0">
+                <a:solidFill>
+                  <a:schemeClr val="bg1"/>
+                </a:solidFill>
+              </a:rPr>
+              <a:t> </a:t>
+            </a:r>
+            <a:r>
+              <a:rPr lang="en-US" dirty="0" err="1">
+                <a:solidFill>
+                  <a:schemeClr val="bg1"/>
+                </a:solidFill>
+              </a:rPr>
+              <a:t>részletek</a:t>
+            </a:r>
+            <a:r>
+              <a:rPr lang="en-US" dirty="0">
+                <a:solidFill>
+                  <a:schemeClr val="bg1"/>
+                </a:solidFill>
+              </a:rPr>
+              <a:t> </a:t>
+            </a:r>
+            <a:r>
+              <a:rPr lang="en-US" dirty="0" err="1">
+                <a:solidFill>
+                  <a:schemeClr val="bg1"/>
+                </a:solidFill>
+              </a:rPr>
+              <a:t>szerinti</a:t>
+            </a:r>
+            <a:r>
+              <a:rPr lang="en-US" dirty="0">
+                <a:solidFill>
+                  <a:schemeClr val="bg1"/>
+                </a:solidFill>
+              </a:rPr>
+              <a:t> </a:t>
+            </a:r>
+            <a:r>
+              <a:rPr lang="en-US" dirty="0" err="1">
+                <a:solidFill>
+                  <a:schemeClr val="bg1"/>
+                </a:solidFill>
+              </a:rPr>
+              <a:t>betöltés</a:t>
+            </a:r>
+            <a:r>
+              <a:rPr lang="en-US" dirty="0">
+                <a:solidFill>
+                  <a:schemeClr val="bg1"/>
+                </a:solidFill>
+              </a:rPr>
+              <a:t>: </a:t>
+            </a:r>
+          </a:p>
+          <a:p>
+            <a:pPr marL="0" indent="0">
+              <a:buNone/>
+            </a:pPr>
+            <a:r>
+              <a:rPr lang="en-US" dirty="0" err="1">
+                <a:solidFill>
+                  <a:schemeClr val="bg1"/>
+                </a:solidFill>
+              </a:rPr>
+              <a:t>Amikor</a:t>
+            </a:r>
+            <a:r>
+              <a:rPr lang="en-US" dirty="0">
+                <a:solidFill>
+                  <a:schemeClr val="bg1"/>
+                </a:solidFill>
+              </a:rPr>
+              <a:t> </a:t>
+            </a:r>
+            <a:r>
+              <a:rPr lang="en-US" dirty="0" err="1">
+                <a:solidFill>
+                  <a:schemeClr val="bg1"/>
+                </a:solidFill>
+              </a:rPr>
+              <a:t>egy</a:t>
+            </a:r>
+            <a:r>
+              <a:rPr lang="en-US" dirty="0">
+                <a:solidFill>
+                  <a:schemeClr val="bg1"/>
+                </a:solidFill>
+              </a:rPr>
+              <a:t> </a:t>
+            </a:r>
+            <a:r>
+              <a:rPr lang="en-US" dirty="0" err="1">
+                <a:solidFill>
+                  <a:schemeClr val="bg1"/>
+                </a:solidFill>
+              </a:rPr>
+              <a:t>konkrét</a:t>
+            </a:r>
+            <a:r>
+              <a:rPr lang="en-US" dirty="0">
+                <a:solidFill>
+                  <a:schemeClr val="bg1"/>
+                </a:solidFill>
+              </a:rPr>
+              <a:t> </a:t>
+            </a:r>
+            <a:r>
+              <a:rPr lang="en-US" dirty="0" err="1">
+                <a:solidFill>
+                  <a:schemeClr val="bg1"/>
+                </a:solidFill>
+              </a:rPr>
+              <a:t>termék</a:t>
+            </a:r>
+            <a:r>
+              <a:rPr lang="en-US" dirty="0">
+                <a:solidFill>
+                  <a:schemeClr val="bg1"/>
+                </a:solidFill>
+              </a:rPr>
+              <a:t> </a:t>
+            </a:r>
+            <a:r>
+              <a:rPr lang="en-US" dirty="0" err="1">
+                <a:solidFill>
+                  <a:schemeClr val="bg1"/>
+                </a:solidFill>
+              </a:rPr>
+              <a:t>részleteit</a:t>
+            </a:r>
+            <a:r>
+              <a:rPr lang="en-US" dirty="0">
+                <a:solidFill>
+                  <a:schemeClr val="bg1"/>
+                </a:solidFill>
+              </a:rPr>
+              <a:t> </a:t>
+            </a:r>
+            <a:r>
+              <a:rPr lang="en-US" dirty="0" err="1">
+                <a:solidFill>
+                  <a:schemeClr val="bg1"/>
+                </a:solidFill>
+              </a:rPr>
+              <a:t>szeretnénk</a:t>
+            </a:r>
+            <a:r>
+              <a:rPr lang="en-US" dirty="0">
+                <a:solidFill>
+                  <a:schemeClr val="bg1"/>
+                </a:solidFill>
+              </a:rPr>
+              <a:t> </a:t>
+            </a:r>
+            <a:r>
+              <a:rPr lang="en-US" dirty="0" err="1">
+                <a:solidFill>
+                  <a:schemeClr val="bg1"/>
+                </a:solidFill>
+              </a:rPr>
+              <a:t>megjeleníteni</a:t>
+            </a:r>
+            <a:r>
+              <a:rPr lang="en-US" dirty="0">
+                <a:solidFill>
+                  <a:schemeClr val="bg1"/>
+                </a:solidFill>
+              </a:rPr>
+              <a:t> (</a:t>
+            </a:r>
+            <a:r>
+              <a:rPr lang="en-US" dirty="0" err="1">
+                <a:solidFill>
+                  <a:schemeClr val="bg1"/>
+                </a:solidFill>
+              </a:rPr>
+              <a:t>például</a:t>
+            </a:r>
+            <a:r>
+              <a:rPr lang="en-US" dirty="0">
+                <a:solidFill>
+                  <a:schemeClr val="bg1"/>
+                </a:solidFill>
+              </a:rPr>
+              <a:t> a </a:t>
+            </a:r>
+            <a:r>
+              <a:rPr lang="en-US" dirty="0" err="1">
+                <a:solidFill>
+                  <a:schemeClr val="bg1"/>
+                </a:solidFill>
+              </a:rPr>
+              <a:t>termékoldalon</a:t>
+            </a:r>
+            <a:r>
+              <a:rPr lang="en-US" dirty="0">
+                <a:solidFill>
+                  <a:schemeClr val="bg1"/>
+                </a:solidFill>
+              </a:rPr>
+              <a:t>), </a:t>
+            </a:r>
+            <a:r>
+              <a:rPr lang="en-US" dirty="0" err="1">
+                <a:solidFill>
+                  <a:schemeClr val="bg1"/>
+                </a:solidFill>
+              </a:rPr>
+              <a:t>akkor</a:t>
+            </a:r>
+            <a:r>
+              <a:rPr lang="en-US" dirty="0">
+                <a:solidFill>
+                  <a:schemeClr val="bg1"/>
+                </a:solidFill>
+              </a:rPr>
+              <a:t> a </a:t>
+            </a:r>
+            <a:r>
+              <a:rPr lang="en-US" dirty="0" err="1">
+                <a:solidFill>
+                  <a:schemeClr val="bg1"/>
+                </a:solidFill>
+              </a:rPr>
+              <a:t>termék</a:t>
+            </a:r>
+            <a:r>
+              <a:rPr lang="en-US" dirty="0">
+                <a:solidFill>
+                  <a:schemeClr val="bg1"/>
+                </a:solidFill>
+              </a:rPr>
+              <a:t> </a:t>
+            </a:r>
+            <a:r>
+              <a:rPr lang="en-US" dirty="0" err="1">
+                <a:solidFill>
+                  <a:schemeClr val="bg1"/>
+                </a:solidFill>
+              </a:rPr>
+              <a:t>egyedi</a:t>
+            </a:r>
+            <a:r>
+              <a:rPr lang="en-US" dirty="0">
+                <a:solidFill>
+                  <a:schemeClr val="bg1"/>
+                </a:solidFill>
+              </a:rPr>
+              <a:t> </a:t>
+            </a:r>
+            <a:r>
+              <a:rPr lang="en-US" dirty="0" err="1">
+                <a:solidFill>
+                  <a:schemeClr val="bg1"/>
+                </a:solidFill>
+              </a:rPr>
+              <a:t>azonosítóját</a:t>
+            </a:r>
+            <a:r>
+              <a:rPr lang="en-US" dirty="0">
+                <a:solidFill>
+                  <a:schemeClr val="bg1"/>
+                </a:solidFill>
+              </a:rPr>
+              <a:t> (ID) </a:t>
+            </a:r>
+            <a:r>
+              <a:rPr lang="en-US" dirty="0" err="1">
+                <a:solidFill>
+                  <a:schemeClr val="bg1"/>
+                </a:solidFill>
+              </a:rPr>
+              <a:t>használjuk</a:t>
+            </a:r>
+            <a:r>
+              <a:rPr lang="en-US" dirty="0">
+                <a:solidFill>
+                  <a:schemeClr val="bg1"/>
+                </a:solidFill>
+              </a:rPr>
+              <a:t>. Az </a:t>
+            </a:r>
+            <a:r>
+              <a:rPr lang="en-US" dirty="0" err="1">
+                <a:solidFill>
+                  <a:schemeClr val="bg1"/>
+                </a:solidFill>
+              </a:rPr>
+              <a:t>adatbázisból</a:t>
+            </a:r>
+            <a:r>
+              <a:rPr lang="en-US" dirty="0">
+                <a:solidFill>
+                  <a:schemeClr val="bg1"/>
+                </a:solidFill>
+              </a:rPr>
+              <a:t> a Product::</a:t>
+            </a:r>
+            <a:r>
+              <a:rPr lang="en-US" dirty="0" err="1">
+                <a:solidFill>
+                  <a:schemeClr val="bg1"/>
+                </a:solidFill>
+              </a:rPr>
+              <a:t>getProductById</a:t>
+            </a:r>
+            <a:r>
+              <a:rPr lang="en-US" dirty="0">
+                <a:solidFill>
+                  <a:schemeClr val="bg1"/>
+                </a:solidFill>
+              </a:rPr>
+              <a:t>() </a:t>
+            </a:r>
+            <a:r>
+              <a:rPr lang="en-US" dirty="0" err="1">
+                <a:solidFill>
+                  <a:schemeClr val="bg1"/>
+                </a:solidFill>
+              </a:rPr>
+              <a:t>metódussal</a:t>
+            </a:r>
+            <a:r>
+              <a:rPr lang="en-US" dirty="0">
+                <a:solidFill>
+                  <a:schemeClr val="bg1"/>
+                </a:solidFill>
+              </a:rPr>
+              <a:t> </a:t>
+            </a:r>
+            <a:r>
+              <a:rPr lang="en-US" dirty="0" err="1">
+                <a:solidFill>
+                  <a:schemeClr val="bg1"/>
+                </a:solidFill>
+              </a:rPr>
+              <a:t>töltjük</a:t>
+            </a:r>
+            <a:r>
+              <a:rPr lang="en-US" dirty="0">
+                <a:solidFill>
+                  <a:schemeClr val="bg1"/>
+                </a:solidFill>
+              </a:rPr>
+              <a:t> le </a:t>
+            </a:r>
+            <a:r>
+              <a:rPr lang="en-US" dirty="0" err="1">
+                <a:solidFill>
+                  <a:schemeClr val="bg1"/>
+                </a:solidFill>
+              </a:rPr>
+              <a:t>az</a:t>
+            </a:r>
+            <a:r>
+              <a:rPr lang="en-US" dirty="0">
+                <a:solidFill>
+                  <a:schemeClr val="bg1"/>
+                </a:solidFill>
+              </a:rPr>
+              <a:t> </a:t>
+            </a:r>
+            <a:r>
+              <a:rPr lang="en-US" dirty="0" err="1">
+                <a:solidFill>
+                  <a:schemeClr val="bg1"/>
+                </a:solidFill>
+              </a:rPr>
+              <a:t>adott</a:t>
+            </a:r>
+            <a:r>
+              <a:rPr lang="en-US" dirty="0">
+                <a:solidFill>
+                  <a:schemeClr val="bg1"/>
+                </a:solidFill>
+              </a:rPr>
+              <a:t> </a:t>
+            </a:r>
+            <a:r>
+              <a:rPr lang="en-US" dirty="0" err="1">
+                <a:solidFill>
+                  <a:schemeClr val="bg1"/>
+                </a:solidFill>
+              </a:rPr>
+              <a:t>termék</a:t>
+            </a:r>
+            <a:r>
+              <a:rPr lang="en-US" dirty="0">
+                <a:solidFill>
+                  <a:schemeClr val="bg1"/>
+                </a:solidFill>
+              </a:rPr>
+              <a:t> </a:t>
+            </a:r>
+            <a:r>
+              <a:rPr lang="en-US" dirty="0" err="1">
+                <a:solidFill>
+                  <a:schemeClr val="bg1"/>
+                </a:solidFill>
+              </a:rPr>
+              <a:t>adatait</a:t>
+            </a:r>
+            <a:r>
+              <a:rPr lang="en-US" dirty="0">
+                <a:solidFill>
+                  <a:schemeClr val="bg1"/>
+                </a:solidFill>
+              </a:rPr>
+              <a:t>, </a:t>
+            </a:r>
+            <a:r>
+              <a:rPr lang="en-US" dirty="0" err="1">
+                <a:solidFill>
+                  <a:schemeClr val="bg1"/>
+                </a:solidFill>
+              </a:rPr>
+              <a:t>így</a:t>
+            </a:r>
+            <a:r>
+              <a:rPr lang="en-US" dirty="0">
+                <a:solidFill>
+                  <a:schemeClr val="bg1"/>
+                </a:solidFill>
+              </a:rPr>
+              <a:t> </a:t>
+            </a:r>
+            <a:r>
+              <a:rPr lang="en-US" dirty="0" err="1">
+                <a:solidFill>
+                  <a:schemeClr val="bg1"/>
+                </a:solidFill>
+              </a:rPr>
+              <a:t>jelennek</a:t>
+            </a:r>
+            <a:r>
+              <a:rPr lang="en-US" dirty="0">
+                <a:solidFill>
+                  <a:schemeClr val="bg1"/>
+                </a:solidFill>
+              </a:rPr>
+              <a:t> meg a </a:t>
+            </a:r>
+            <a:r>
+              <a:rPr lang="en-US" dirty="0" err="1">
+                <a:solidFill>
+                  <a:schemeClr val="bg1"/>
+                </a:solidFill>
+              </a:rPr>
+              <a:t>részletes</a:t>
+            </a:r>
+            <a:r>
+              <a:rPr lang="en-US" dirty="0">
+                <a:solidFill>
+                  <a:schemeClr val="bg1"/>
+                </a:solidFill>
+              </a:rPr>
+              <a:t> </a:t>
+            </a:r>
+            <a:r>
+              <a:rPr lang="en-US" dirty="0" err="1">
+                <a:solidFill>
+                  <a:schemeClr val="bg1"/>
+                </a:solidFill>
+              </a:rPr>
+              <a:t>információk</a:t>
+            </a:r>
+            <a:r>
+              <a:rPr lang="en-US" dirty="0">
+                <a:solidFill>
+                  <a:schemeClr val="bg1"/>
+                </a:solidFill>
+              </a:rPr>
+              <a:t> (pl. </a:t>
+            </a:r>
+            <a:r>
+              <a:rPr lang="en-US" dirty="0" err="1">
+                <a:solidFill>
+                  <a:schemeClr val="bg1"/>
+                </a:solidFill>
+              </a:rPr>
+              <a:t>ár</a:t>
+            </a:r>
+            <a:r>
+              <a:rPr lang="en-US" dirty="0">
+                <a:solidFill>
+                  <a:schemeClr val="bg1"/>
+                </a:solidFill>
+              </a:rPr>
+              <a:t>, </a:t>
+            </a:r>
+            <a:r>
+              <a:rPr lang="en-US" dirty="0" err="1">
+                <a:solidFill>
+                  <a:schemeClr val="bg1"/>
+                </a:solidFill>
+              </a:rPr>
+              <a:t>leírás</a:t>
+            </a:r>
+            <a:r>
+              <a:rPr lang="en-US" dirty="0">
+                <a:solidFill>
+                  <a:schemeClr val="bg1"/>
+                </a:solidFill>
+              </a:rPr>
+              <a:t>, </a:t>
+            </a:r>
+            <a:r>
+              <a:rPr lang="en-US" dirty="0" err="1">
+                <a:solidFill>
+                  <a:schemeClr val="bg1"/>
+                </a:solidFill>
+              </a:rPr>
+              <a:t>kép</a:t>
+            </a:r>
+            <a:r>
+              <a:rPr lang="en-US" dirty="0">
+                <a:solidFill>
+                  <a:schemeClr val="bg1"/>
+                </a:solidFill>
+              </a:rPr>
+              <a:t>) </a:t>
+            </a:r>
+            <a:r>
+              <a:rPr lang="en-US" dirty="0" err="1">
+                <a:solidFill>
+                  <a:schemeClr val="bg1"/>
+                </a:solidFill>
+              </a:rPr>
+              <a:t>az</a:t>
+            </a:r>
+            <a:r>
+              <a:rPr lang="en-US" dirty="0">
+                <a:solidFill>
+                  <a:schemeClr val="bg1"/>
+                </a:solidFill>
+              </a:rPr>
+              <a:t> </a:t>
+            </a:r>
+            <a:r>
+              <a:rPr lang="en-US" dirty="0" err="1">
+                <a:solidFill>
+                  <a:schemeClr val="bg1"/>
+                </a:solidFill>
+              </a:rPr>
+              <a:t>oldalon</a:t>
+            </a:r>
+            <a:r>
+              <a:rPr lang="en-US" dirty="0">
+                <a:solidFill>
+                  <a:schemeClr val="bg1"/>
+                </a:solidFill>
+              </a:rPr>
+              <a:t>.</a:t>
+            </a:r>
+          </a:p>
+          <a:p>
+            <a:endParaRPr lang="en-US" dirty="0">
+              <a:solidFill>
+                <a:schemeClr val="bg1"/>
+              </a:solidFill>
+            </a:endParaRPr>
+          </a:p>
+        </p:txBody>
+      </p:sp>
+      <p:pic>
+        <p:nvPicPr>
+          <p:cNvPr id="5" name="Picture 4">
+            <a:extLst>
+              <a:ext uri="{FF2B5EF4-FFF2-40B4-BE49-F238E27FC236}">
+                <a16:creationId xmlns:a16="http://schemas.microsoft.com/office/drawing/2014/main" id="{838ACB84-50C5-A067-4852-CAE9AB7B0A2A}"/>
+              </a:ext>
+            </a:extLst>
+          </p:cNvPr>
+          <p:cNvPicPr>
+            <a:picLocks noChangeAspect="1"/>
+          </p:cNvPicPr>
+          <p:nvPr/>
+        </p:nvPicPr>
+        <p:blipFill>
+          <a:blip r:embed="rId2"/>
+          <a:stretch>
+            <a:fillRect/>
+          </a:stretch>
+        </p:blipFill>
+        <p:spPr>
+          <a:xfrm>
+            <a:off x="6246586" y="1178351"/>
+            <a:ext cx="5945414" cy="2685742"/>
+          </a:xfrm>
+          <a:prstGeom prst="rect">
+            <a:avLst/>
+          </a:prstGeom>
+        </p:spPr>
+      </p:pic>
+      <p:pic>
+        <p:nvPicPr>
+          <p:cNvPr id="7" name="Picture 6">
+            <a:extLst>
+              <a:ext uri="{FF2B5EF4-FFF2-40B4-BE49-F238E27FC236}">
+                <a16:creationId xmlns:a16="http://schemas.microsoft.com/office/drawing/2014/main" id="{2F70EC54-8F8F-3B6D-DD17-0B7E77D503DD}"/>
+              </a:ext>
+            </a:extLst>
+          </p:cNvPr>
+          <p:cNvPicPr>
+            <a:picLocks noChangeAspect="1"/>
+          </p:cNvPicPr>
+          <p:nvPr/>
+        </p:nvPicPr>
+        <p:blipFill>
+          <a:blip r:embed="rId3"/>
+          <a:stretch>
+            <a:fillRect/>
+          </a:stretch>
+        </p:blipFill>
+        <p:spPr>
+          <a:xfrm>
+            <a:off x="6306778" y="4160084"/>
+            <a:ext cx="5885222" cy="2697916"/>
+          </a:xfrm>
+          <a:prstGeom prst="rect">
+            <a:avLst/>
+          </a:prstGeom>
+        </p:spPr>
+      </p:pic>
+    </p:spTree>
+    <p:extLst>
+      <p:ext uri="{BB962C8B-B14F-4D97-AF65-F5344CB8AC3E}">
+        <p14:creationId xmlns:p14="http://schemas.microsoft.com/office/powerpoint/2010/main" val="691180209"/>
+      </p:ext>
+    </p:extLst>
+  </p:cSld>
+  <p:clrMapOvr>
+    <a:masterClrMapping/>
+  </p:clrMapOvr>
+</p:sld>
+</file>
+
+<file path=ppt/slides/slide8.xml><?xml version="1.0" encoding="utf-8"?>
+<p:sld xmlns:a="http://schemas.openxmlformats.org/drawingml/2006/main" xmlns:r="http://schemas.openxmlformats.org/officeDocument/2006/relationships" xmlns:p="http://schemas.openxmlformats.org/presentationml/2006/main">
+  <p:cSld>
+    <p:spTree>
+      <p:nvGrpSpPr>
+        <p:cNvPr id="1" name=""/>
+        <p:cNvGrpSpPr/>
+        <p:nvPr/>
+      </p:nvGrpSpPr>
+      <p:grpSpPr>
+        <a:xfrm>
+          <a:off x="0" y="0"/>
+          <a:ext cx="0" cy="0"/>
+          <a:chOff x="0" y="0"/>
+          <a:chExt cx="0" cy="0"/>
+        </a:xfrm>
+      </p:grpSpPr>
+      <p:sp>
+        <p:nvSpPr>
+          <p:cNvPr id="2" name="Title 1">
+            <a:extLst>
+              <a:ext uri="{FF2B5EF4-FFF2-40B4-BE49-F238E27FC236}">
                 <a16:creationId xmlns:a16="http://schemas.microsoft.com/office/drawing/2014/main" id="{98CEF6F3-FA39-D6D7-F2E6-5457D1B97B15}"/>
               </a:ext>
             </a:extLst>
@@ -8492,30 +10168,46 @@
         </p:nvSpPr>
         <p:spPr>
           <a:xfrm>
-            <a:off x="382555" y="1319752"/>
-            <a:ext cx="8534400" cy="5538247"/>
+            <a:off x="631195" y="1310326"/>
+            <a:ext cx="10929610" cy="2479250"/>
           </a:xfrm>
         </p:spPr>
         <p:txBody>
           <a:bodyPr>
-            <a:normAutofit fontScale="77500" lnSpcReduction="20000"/>
+            <a:normAutofit/>
           </a:bodyPr>
           <a:lstStyle/>
           <a:p>
             <a:r>
-              <a:rPr lang="en-US" dirty="0" err="1"/>
+              <a:rPr lang="en-US" dirty="0" err="1">
+                <a:solidFill>
+                  <a:schemeClr val="bg1"/>
+                </a:solidFill>
+              </a:rPr>
               <a:t>Kosár</a:t>
             </a:r>
             <a:r>
-              <a:rPr lang="en-US" dirty="0"/>
-              <a:t> </a:t>
-            </a:r>
-            <a:r>
-              <a:rPr lang="en-US" dirty="0" err="1"/>
+              <a:rPr lang="en-US" dirty="0">
+                <a:solidFill>
+                  <a:schemeClr val="bg1"/>
+                </a:solidFill>
+              </a:rPr>
+              <a:t> </a:t>
+            </a:r>
+            <a:r>
+              <a:rPr lang="en-US" dirty="0" err="1">
+                <a:solidFill>
+                  <a:schemeClr val="bg1"/>
+                </a:solidFill>
+              </a:rPr>
               <a:t>funkció</a:t>
             </a:r>
             <a:r>
-              <a:rPr lang="en-US" dirty="0"/>
+              <a:rPr lang="en-US" dirty="0">
+                <a:solidFill>
+                  <a:schemeClr val="bg1"/>
+                </a:solidFill>
+              </a:rPr>
               <a:t>: </a:t>
             </a:r>
           </a:p>
@@ -8523,174 +10215,342 @@
             <a:pPr marL="0" indent="0">
               <a:buNone/>
             </a:pPr>
-            <a:endParaRPr lang="en-US" dirty="0"/>
+            <a:endParaRPr lang="en-US" dirty="0">
+              <a:solidFill>
+                <a:schemeClr val="bg1"/>
+              </a:solidFill>
+            </a:endParaRPr>
           </a:p>
           <a:p>
             <a:pPr marL="0" indent="0">
               <a:buNone/>
             </a:pPr>
             <a:r>
-              <a:rPr lang="en-US" dirty="0"/>
+              <a:rPr lang="en-US" dirty="0">
+                <a:solidFill>
+                  <a:schemeClr val="bg1"/>
+                </a:solidFill>
+              </a:rPr>
               <a:t>A </a:t>
             </a:r>
             <a:r>
-              <a:rPr lang="en-US" dirty="0" err="1"/>
+              <a:rPr lang="en-US" dirty="0" err="1">
+                <a:solidFill>
+                  <a:schemeClr val="bg1"/>
+                </a:solidFill>
+              </a:rPr>
               <a:t>felhasználók</a:t>
             </a:r>
             <a:r>
-              <a:rPr lang="en-US" dirty="0"/>
-              <a:t> </a:t>
-            </a:r>
-            <a:r>
-              <a:rPr lang="en-US" dirty="0" err="1"/>
+              <a:rPr lang="en-US" dirty="0">
+                <a:solidFill>
+                  <a:schemeClr val="bg1"/>
+                </a:solidFill>
+              </a:rPr>
+              <a:t> </a:t>
+            </a:r>
+            <a:r>
+              <a:rPr lang="en-US" dirty="0" err="1">
+                <a:solidFill>
+                  <a:schemeClr val="bg1"/>
+                </a:solidFill>
+              </a:rPr>
               <a:t>termékeket</a:t>
             </a:r>
             <a:r>
-              <a:rPr lang="en-US" dirty="0"/>
-              <a:t> </a:t>
-            </a:r>
-            <a:r>
-              <a:rPr lang="en-US" dirty="0" err="1"/>
+              <a:rPr lang="en-US" dirty="0">
+                <a:solidFill>
+                  <a:schemeClr val="bg1"/>
+                </a:solidFill>
+              </a:rPr>
+              <a:t> </a:t>
+            </a:r>
+            <a:r>
+              <a:rPr lang="en-US" dirty="0" err="1">
+                <a:solidFill>
+                  <a:schemeClr val="bg1"/>
+                </a:solidFill>
+              </a:rPr>
               <a:t>adhatnak</a:t>
             </a:r>
             <a:r>
-              <a:rPr lang="en-US" dirty="0"/>
+              <a:rPr lang="en-US" dirty="0">
+                <a:solidFill>
+                  <a:schemeClr val="bg1"/>
+                </a:solidFill>
+              </a:rPr>
               <a:t> a </a:t>
             </a:r>
             <a:r>
-              <a:rPr lang="en-US" dirty="0" err="1"/>
+              <a:rPr lang="en-US" dirty="0" err="1">
+                <a:solidFill>
+                  <a:schemeClr val="bg1"/>
+                </a:solidFill>
+              </a:rPr>
               <a:t>kosárhoz</a:t>
             </a:r>
             <a:r>
-              <a:rPr lang="en-US" dirty="0"/>
+              <a:rPr lang="en-US" dirty="0">
+                <a:solidFill>
+                  <a:schemeClr val="bg1"/>
+                </a:solidFill>
+              </a:rPr>
               <a:t>, </a:t>
             </a:r>
             <a:r>
-              <a:rPr lang="en-US" dirty="0" err="1"/>
+              <a:rPr lang="en-US" dirty="0" err="1">
+                <a:solidFill>
+                  <a:schemeClr val="bg1"/>
+                </a:solidFill>
+              </a:rPr>
               <a:t>és</a:t>
             </a:r>
             <a:r>
-              <a:rPr lang="en-US" dirty="0"/>
+              <a:rPr lang="en-US" dirty="0">
+                <a:solidFill>
+                  <a:schemeClr val="bg1"/>
+                </a:solidFill>
+              </a:rPr>
               <a:t> a cart </a:t>
             </a:r>
             <a:r>
-              <a:rPr lang="en-US" dirty="0" err="1"/>
+              <a:rPr lang="en-US" dirty="0" err="1">
+                <a:solidFill>
+                  <a:schemeClr val="bg1"/>
+                </a:solidFill>
+              </a:rPr>
               <a:t>táblában</a:t>
             </a:r>
             <a:r>
-              <a:rPr lang="en-US" dirty="0"/>
-              <a:t> </a:t>
-            </a:r>
-            <a:r>
-              <a:rPr lang="en-US" dirty="0" err="1"/>
+              <a:rPr lang="en-US" dirty="0">
+                <a:solidFill>
+                  <a:schemeClr val="bg1"/>
+                </a:solidFill>
+              </a:rPr>
+              <a:t> </a:t>
+            </a:r>
+            <a:r>
+              <a:rPr lang="en-US" dirty="0" err="1">
+                <a:solidFill>
+                  <a:schemeClr val="bg1"/>
+                </a:solidFill>
+              </a:rPr>
               <a:t>tárolódik</a:t>
             </a:r>
             <a:r>
-              <a:rPr lang="en-US" dirty="0"/>
-              <a:t> </a:t>
-            </a:r>
-            <a:r>
-              <a:rPr lang="en-US" dirty="0" err="1"/>
+              <a:rPr lang="en-US" dirty="0">
+                <a:solidFill>
+                  <a:schemeClr val="bg1"/>
+                </a:solidFill>
+              </a:rPr>
+              <a:t> </a:t>
+            </a:r>
+            <a:r>
+              <a:rPr lang="en-US" dirty="0" err="1">
+                <a:solidFill>
+                  <a:schemeClr val="bg1"/>
+                </a:solidFill>
+              </a:rPr>
               <a:t>az</a:t>
             </a:r>
             <a:r>
-              <a:rPr lang="en-US" dirty="0"/>
-              <a:t> </a:t>
-            </a:r>
-            <a:r>
-              <a:rPr lang="en-US" dirty="0" err="1"/>
+              <a:rPr lang="en-US" dirty="0">
+                <a:solidFill>
+                  <a:schemeClr val="bg1"/>
+                </a:solidFill>
+              </a:rPr>
+              <a:t> </a:t>
+            </a:r>
+            <a:r>
+              <a:rPr lang="en-US" dirty="0" err="1">
+                <a:solidFill>
+                  <a:schemeClr val="bg1"/>
+                </a:solidFill>
+              </a:rPr>
               <a:t>aktuális</a:t>
             </a:r>
             <a:r>
-              <a:rPr lang="en-US" dirty="0"/>
-              <a:t> </a:t>
-            </a:r>
-            <a:r>
-              <a:rPr lang="en-US" dirty="0" err="1"/>
+              <a:rPr lang="en-US" dirty="0">
+                <a:solidFill>
+                  <a:schemeClr val="bg1"/>
+                </a:solidFill>
+              </a:rPr>
+              <a:t> </a:t>
+            </a:r>
+            <a:r>
+              <a:rPr lang="en-US" dirty="0" err="1">
+                <a:solidFill>
+                  <a:schemeClr val="bg1"/>
+                </a:solidFill>
+              </a:rPr>
               <a:t>vásárlás</a:t>
             </a:r>
             <a:r>
-              <a:rPr lang="en-US" dirty="0"/>
+              <a:rPr lang="en-US" dirty="0">
+                <a:solidFill>
+                  <a:schemeClr val="bg1"/>
+                </a:solidFill>
+              </a:rPr>
               <a:t>. A </a:t>
             </a:r>
             <a:r>
-              <a:rPr lang="en-US" dirty="0" err="1"/>
+              <a:rPr lang="en-US" dirty="0" err="1">
+                <a:solidFill>
+                  <a:schemeClr val="bg1"/>
+                </a:solidFill>
+              </a:rPr>
               <a:t>product_id</a:t>
             </a:r>
             <a:r>
-              <a:rPr lang="en-US" dirty="0"/>
-              <a:t> </a:t>
-            </a:r>
-            <a:r>
-              <a:rPr lang="en-US" dirty="0" err="1"/>
+              <a:rPr lang="en-US" dirty="0">
+                <a:solidFill>
+                  <a:schemeClr val="bg1"/>
+                </a:solidFill>
+              </a:rPr>
+              <a:t> </a:t>
+            </a:r>
+            <a:r>
+              <a:rPr lang="en-US" dirty="0" err="1">
+                <a:solidFill>
+                  <a:schemeClr val="bg1"/>
+                </a:solidFill>
+              </a:rPr>
               <a:t>és</a:t>
             </a:r>
             <a:r>
-              <a:rPr lang="en-US" dirty="0"/>
-              <a:t> </a:t>
-            </a:r>
-            <a:r>
-              <a:rPr lang="en-US" dirty="0" err="1"/>
+              <a:rPr lang="en-US" dirty="0">
+                <a:solidFill>
+                  <a:schemeClr val="bg1"/>
+                </a:solidFill>
+              </a:rPr>
+              <a:t> </a:t>
+            </a:r>
+            <a:r>
+              <a:rPr lang="en-US" dirty="0" err="1">
+                <a:solidFill>
+                  <a:schemeClr val="bg1"/>
+                </a:solidFill>
+              </a:rPr>
               <a:t>user_id</a:t>
             </a:r>
             <a:r>
-              <a:rPr lang="en-US" dirty="0"/>
-              <a:t> </a:t>
-            </a:r>
-            <a:r>
-              <a:rPr lang="en-US" dirty="0" err="1"/>
+              <a:rPr lang="en-US" dirty="0">
+                <a:solidFill>
+                  <a:schemeClr val="bg1"/>
+                </a:solidFill>
+              </a:rPr>
+              <a:t> </a:t>
+            </a:r>
+            <a:r>
+              <a:rPr lang="en-US" dirty="0" err="1">
+                <a:solidFill>
+                  <a:schemeClr val="bg1"/>
+                </a:solidFill>
+              </a:rPr>
               <a:t>kulcsok</a:t>
             </a:r>
             <a:r>
-              <a:rPr lang="en-US" dirty="0"/>
-              <a:t> </a:t>
-            </a:r>
-            <a:r>
-              <a:rPr lang="en-US" dirty="0" err="1"/>
+              <a:rPr lang="en-US" dirty="0">
+                <a:solidFill>
+                  <a:schemeClr val="bg1"/>
+                </a:solidFill>
+              </a:rPr>
+              <a:t> </a:t>
+            </a:r>
+            <a:r>
+              <a:rPr lang="en-US" dirty="0" err="1">
+                <a:solidFill>
+                  <a:schemeClr val="bg1"/>
+                </a:solidFill>
+              </a:rPr>
               <a:t>segítségével</a:t>
             </a:r>
             <a:r>
-              <a:rPr lang="en-US" dirty="0"/>
-              <a:t> </a:t>
-            </a:r>
-            <a:r>
-              <a:rPr lang="en-US" dirty="0" err="1"/>
+              <a:rPr lang="en-US" dirty="0">
+                <a:solidFill>
+                  <a:schemeClr val="bg1"/>
+                </a:solidFill>
+              </a:rPr>
+              <a:t> </a:t>
+            </a:r>
+            <a:r>
+              <a:rPr lang="en-US" dirty="0" err="1">
+                <a:solidFill>
+                  <a:schemeClr val="bg1"/>
+                </a:solidFill>
+              </a:rPr>
               <a:t>kapcsolódnak</a:t>
             </a:r>
             <a:r>
-              <a:rPr lang="en-US" dirty="0"/>
-              <a:t> </a:t>
-            </a:r>
-            <a:r>
-              <a:rPr lang="en-US" dirty="0" err="1"/>
+              <a:rPr lang="en-US" dirty="0">
+                <a:solidFill>
+                  <a:schemeClr val="bg1"/>
+                </a:solidFill>
+              </a:rPr>
+              <a:t> </a:t>
+            </a:r>
+            <a:r>
+              <a:rPr lang="en-US" dirty="0" err="1">
+                <a:solidFill>
+                  <a:schemeClr val="bg1"/>
+                </a:solidFill>
+              </a:rPr>
               <a:t>az</a:t>
             </a:r>
             <a:r>
-              <a:rPr lang="en-US" dirty="0"/>
-              <a:t> </a:t>
-            </a:r>
-            <a:r>
-              <a:rPr lang="en-US" dirty="0" err="1"/>
+              <a:rPr lang="en-US" dirty="0">
+                <a:solidFill>
+                  <a:schemeClr val="bg1"/>
+                </a:solidFill>
+              </a:rPr>
+              <a:t> </a:t>
+            </a:r>
+            <a:r>
+              <a:rPr lang="en-US" dirty="0" err="1">
+                <a:solidFill>
+                  <a:schemeClr val="bg1"/>
+                </a:solidFill>
+              </a:rPr>
               <a:t>adott</a:t>
             </a:r>
             <a:r>
-              <a:rPr lang="en-US" dirty="0"/>
-              <a:t> </a:t>
-            </a:r>
-            <a:r>
-              <a:rPr lang="en-US" dirty="0" err="1"/>
+              <a:rPr lang="en-US" dirty="0">
+                <a:solidFill>
+                  <a:schemeClr val="bg1"/>
+                </a:solidFill>
+              </a:rPr>
+              <a:t> </a:t>
+            </a:r>
+            <a:r>
+              <a:rPr lang="en-US" dirty="0" err="1">
+                <a:solidFill>
+                  <a:schemeClr val="bg1"/>
+                </a:solidFill>
+              </a:rPr>
               <a:t>termékek</a:t>
             </a:r>
             <a:r>
-              <a:rPr lang="en-US" dirty="0"/>
+              <a:rPr lang="en-US" dirty="0">
+                <a:solidFill>
+                  <a:schemeClr val="bg1"/>
+                </a:solidFill>
+              </a:rPr>
               <a:t> a </a:t>
             </a:r>
             <a:r>
-              <a:rPr lang="en-US" dirty="0" err="1"/>
+              <a:rPr lang="en-US" dirty="0" err="1">
+                <a:solidFill>
+                  <a:schemeClr val="bg1"/>
+                </a:solidFill>
+              </a:rPr>
               <a:t>felhasználókhoz</a:t>
             </a:r>
             <a:r>
-              <a:rPr lang="en-US" dirty="0"/>
+              <a:rPr lang="en-US" dirty="0">
+                <a:solidFill>
+                  <a:schemeClr val="bg1"/>
+                </a:solidFill>
+              </a:rPr>
               <a:t>.</a:t>
             </a:r>
           </a:p>
@@ -8698,366 +10558,595 @@
             <a:pPr marL="0" indent="0">
               <a:buNone/>
             </a:pPr>
-            <a:endParaRPr lang="en-US" dirty="0"/>
-          </a:p>
-          <a:p>
-            <a:r>
-              <a:rPr lang="en-US" dirty="0" err="1"/>
-              <a:t>Rendelés</a:t>
-            </a:r>
-            <a:r>
-              <a:rPr lang="en-US" dirty="0"/>
-              <a:t> </a:t>
-            </a:r>
-            <a:r>
-              <a:rPr lang="en-US" dirty="0" err="1"/>
-              <a:t>leadása</a:t>
-            </a:r>
-            <a:r>
-              <a:rPr lang="en-US" dirty="0"/>
-              <a:t> </a:t>
-            </a:r>
-            <a:r>
-              <a:rPr lang="en-US" dirty="0" err="1"/>
-              <a:t>és</a:t>
-            </a:r>
-            <a:r>
-              <a:rPr lang="en-US" dirty="0"/>
-              <a:t> </a:t>
-            </a:r>
-            <a:r>
-              <a:rPr lang="en-US" dirty="0" err="1"/>
-              <a:t>nyomon</a:t>
-            </a:r>
-            <a:r>
-              <a:rPr lang="en-US" dirty="0"/>
-              <a:t> </a:t>
-            </a:r>
-            <a:r>
-              <a:rPr lang="en-US" dirty="0" err="1"/>
-              <a:t>követés</a:t>
-            </a:r>
-            <a:r>
-              <a:rPr lang="en-US" dirty="0"/>
-              <a:t>: </a:t>
-            </a:r>
+            <a:endParaRPr lang="en-US" dirty="0">
+              <a:solidFill>
+                <a:schemeClr val="bg1"/>
+              </a:solidFill>
+            </a:endParaRPr>
           </a:p>
           <a:p>
             <a:pPr marL="0" indent="0">
               <a:buNone/>
             </a:pPr>
-            <a:endParaRPr lang="en-US" dirty="0"/>
-          </a:p>
-          <a:p>
-            <a:pPr marL="0" indent="0">
-              <a:buNone/>
-            </a:pPr>
-            <a:r>
-              <a:rPr lang="en-US" dirty="0"/>
-              <a:t>A </a:t>
-            </a:r>
-            <a:r>
-              <a:rPr lang="en-US" dirty="0" err="1"/>
-              <a:t>felhasználók</a:t>
-            </a:r>
-            <a:r>
-              <a:rPr lang="en-US" dirty="0"/>
-              <a:t> </a:t>
-            </a:r>
-            <a:r>
-              <a:rPr lang="en-US" dirty="0" err="1"/>
-              <a:t>rendeléseiket</a:t>
-            </a:r>
-            <a:r>
-              <a:rPr lang="en-US" dirty="0"/>
-              <a:t> </a:t>
-            </a:r>
-            <a:r>
-              <a:rPr lang="en-US" dirty="0" err="1"/>
-              <a:t>az</a:t>
-            </a:r>
-            <a:r>
-              <a:rPr lang="en-US" dirty="0"/>
-              <a:t> orders </a:t>
-            </a:r>
-            <a:r>
-              <a:rPr lang="en-US" dirty="0" err="1"/>
-              <a:t>és</a:t>
-            </a:r>
-            <a:r>
-              <a:rPr lang="en-US" dirty="0"/>
-              <a:t> </a:t>
-            </a:r>
-            <a:r>
-              <a:rPr lang="en-US" dirty="0" err="1"/>
-              <a:t>orders_items</a:t>
-            </a:r>
-            <a:r>
-              <a:rPr lang="en-US" dirty="0"/>
-              <a:t> </a:t>
-            </a:r>
-            <a:r>
-              <a:rPr lang="en-US" dirty="0" err="1"/>
-              <a:t>táblákban</a:t>
-            </a:r>
-            <a:r>
-              <a:rPr lang="en-US" dirty="0"/>
-              <a:t> </a:t>
-            </a:r>
-            <a:r>
-              <a:rPr lang="en-US" dirty="0" err="1"/>
-              <a:t>tárolják</a:t>
-            </a:r>
-            <a:r>
-              <a:rPr lang="en-US" dirty="0"/>
-              <a:t>. A </a:t>
-            </a:r>
-            <a:r>
-              <a:rPr lang="en-US" dirty="0" err="1"/>
-              <a:t>rendelés</a:t>
-            </a:r>
-            <a:r>
-              <a:rPr lang="en-US" dirty="0"/>
-              <a:t> </a:t>
-            </a:r>
-            <a:r>
-              <a:rPr lang="en-US" dirty="0" err="1"/>
-              <a:t>egyedi</a:t>
-            </a:r>
-            <a:r>
-              <a:rPr lang="en-US" dirty="0"/>
-              <a:t> </a:t>
-            </a:r>
-            <a:r>
-              <a:rPr lang="en-US" dirty="0" err="1"/>
-              <a:t>order_id-val</a:t>
-            </a:r>
-            <a:r>
-              <a:rPr lang="en-US" dirty="0"/>
-              <a:t> van </a:t>
-            </a:r>
-            <a:r>
-              <a:rPr lang="en-US" dirty="0" err="1"/>
-              <a:t>azonosítva</a:t>
-            </a:r>
-            <a:r>
-              <a:rPr lang="en-US" dirty="0"/>
-              <a:t>, </a:t>
-            </a:r>
-            <a:r>
-              <a:rPr lang="en-US" dirty="0" err="1"/>
-              <a:t>amely</a:t>
-            </a:r>
-            <a:r>
-              <a:rPr lang="en-US" dirty="0"/>
-              <a:t> </a:t>
-            </a:r>
-            <a:r>
-              <a:rPr lang="en-US" dirty="0" err="1"/>
-              <a:t>lehetővé</a:t>
-            </a:r>
-            <a:r>
-              <a:rPr lang="en-US" dirty="0"/>
-              <a:t> </a:t>
-            </a:r>
-            <a:r>
-              <a:rPr lang="en-US" dirty="0" err="1"/>
-              <a:t>teszi</a:t>
-            </a:r>
-            <a:r>
-              <a:rPr lang="en-US" dirty="0"/>
-              <a:t> a </a:t>
-            </a:r>
-            <a:r>
-              <a:rPr lang="en-US" dirty="0" err="1"/>
-              <a:t>rendelési</a:t>
-            </a:r>
-            <a:r>
-              <a:rPr lang="en-US" dirty="0"/>
-              <a:t> </a:t>
-            </a:r>
-            <a:r>
-              <a:rPr lang="en-US" dirty="0" err="1"/>
-              <a:t>tételek</a:t>
-            </a:r>
-            <a:r>
-              <a:rPr lang="en-US" dirty="0"/>
-              <a:t> </a:t>
-            </a:r>
-            <a:r>
-              <a:rPr lang="en-US" dirty="0" err="1"/>
-              <a:t>lekérdezését</a:t>
-            </a:r>
-            <a:r>
-              <a:rPr lang="en-US" dirty="0"/>
-              <a:t>.</a:t>
-            </a:r>
-          </a:p>
-          <a:p>
-            <a:pPr marL="0" indent="0">
-              <a:buNone/>
-            </a:pPr>
-            <a:endParaRPr lang="en-US" dirty="0"/>
-          </a:p>
-          <a:p>
-            <a:r>
-              <a:rPr lang="en-US" dirty="0" err="1"/>
-              <a:t>Rendelések</a:t>
-            </a:r>
-            <a:r>
-              <a:rPr lang="en-US" dirty="0"/>
-              <a:t> </a:t>
-            </a:r>
-            <a:r>
-              <a:rPr lang="en-US" dirty="0" err="1"/>
-              <a:t>visszakeresése</a:t>
-            </a:r>
-            <a:r>
-              <a:rPr lang="en-US" dirty="0"/>
-              <a:t> </a:t>
-            </a:r>
-            <a:r>
-              <a:rPr lang="en-US" dirty="0" err="1"/>
-              <a:t>és</a:t>
-            </a:r>
-            <a:r>
-              <a:rPr lang="en-US" dirty="0"/>
-              <a:t> </a:t>
-            </a:r>
-            <a:r>
-              <a:rPr lang="en-US" dirty="0" err="1"/>
-              <a:t>lemondása</a:t>
-            </a:r>
-            <a:r>
-              <a:rPr lang="en-US" dirty="0"/>
-              <a:t>: </a:t>
-            </a:r>
-          </a:p>
-          <a:p>
-            <a:pPr marL="0" indent="0">
-              <a:buNone/>
-            </a:pPr>
-            <a:endParaRPr lang="en-US" dirty="0"/>
-          </a:p>
-          <a:p>
-            <a:pPr marL="0" indent="0">
-              <a:buNone/>
-            </a:pPr>
-            <a:r>
-              <a:rPr lang="en-US" dirty="0"/>
-              <a:t>A </a:t>
-            </a:r>
-            <a:r>
-              <a:rPr lang="en-US" dirty="0" err="1"/>
-              <a:t>felhasználók</a:t>
-            </a:r>
-            <a:r>
-              <a:rPr lang="en-US" dirty="0"/>
-              <a:t> </a:t>
-            </a:r>
-            <a:r>
-              <a:rPr lang="en-US" dirty="0" err="1"/>
-              <a:t>visszakereshetik</a:t>
-            </a:r>
-            <a:r>
-              <a:rPr lang="en-US" dirty="0"/>
-              <a:t> </a:t>
-            </a:r>
-            <a:r>
-              <a:rPr lang="en-US" dirty="0" err="1"/>
-              <a:t>korábbi</a:t>
-            </a:r>
-            <a:r>
-              <a:rPr lang="en-US" dirty="0"/>
-              <a:t> </a:t>
-            </a:r>
-            <a:r>
-              <a:rPr lang="en-US" dirty="0" err="1"/>
-              <a:t>rendeléseiket</a:t>
-            </a:r>
-            <a:r>
-              <a:rPr lang="en-US" dirty="0"/>
-              <a:t>, </a:t>
-            </a:r>
-            <a:r>
-              <a:rPr lang="en-US" dirty="0" err="1"/>
-              <a:t>és</a:t>
-            </a:r>
-            <a:r>
-              <a:rPr lang="en-US" dirty="0"/>
-              <a:t> a orders </a:t>
-            </a:r>
-            <a:r>
-              <a:rPr lang="en-US" dirty="0" err="1"/>
-              <a:t>táblában</a:t>
-            </a:r>
-            <a:r>
-              <a:rPr lang="en-US" dirty="0"/>
-              <a:t> </a:t>
-            </a:r>
-            <a:r>
-              <a:rPr lang="en-US" dirty="0" err="1"/>
-              <a:t>nyomon</a:t>
-            </a:r>
-            <a:r>
-              <a:rPr lang="en-US" dirty="0"/>
-              <a:t> </a:t>
-            </a:r>
-            <a:r>
-              <a:rPr lang="en-US" dirty="0" err="1"/>
-              <a:t>követhetik</a:t>
-            </a:r>
-            <a:r>
-              <a:rPr lang="en-US" dirty="0"/>
-              <a:t>, </a:t>
-            </a:r>
-            <a:r>
-              <a:rPr lang="en-US" dirty="0" err="1"/>
-              <a:t>illetve</a:t>
-            </a:r>
-            <a:r>
-              <a:rPr lang="en-US" dirty="0"/>
-              <a:t> </a:t>
-            </a:r>
-            <a:r>
-              <a:rPr lang="en-US" dirty="0" err="1"/>
-              <a:t>lemondhatják</a:t>
-            </a:r>
-            <a:r>
-              <a:rPr lang="en-US" dirty="0"/>
-              <a:t> </a:t>
-            </a:r>
-            <a:r>
-              <a:rPr lang="en-US" dirty="0" err="1"/>
-              <a:t>rendeléseiket</a:t>
-            </a:r>
-            <a:r>
-              <a:rPr lang="en-US" dirty="0"/>
-              <a:t>.</a:t>
-            </a:r>
-          </a:p>
-          <a:p>
-            <a:pPr marL="0" indent="0">
-              <a:buNone/>
-            </a:pPr>
-            <a:endParaRPr lang="en-US" dirty="0"/>
-          </a:p>
-          <a:p>
-            <a:pPr marL="0" indent="0">
-              <a:buNone/>
-            </a:pPr>
-            <a:r>
-              <a:rPr lang="hu-HU" dirty="0"/>
-              <a:t>Ez a struktúra biztosítja, hogy a termékek kategória szerinti vagy ID alapú lekérdezéssel töltődjenek be, és minden vásárlói művelet az adatbázisban tárolt kapcsolatok alapján történjen.</a:t>
-            </a:r>
-            <a:endParaRPr lang="en-US" dirty="0"/>
-          </a:p>
-        </p:txBody>
-      </p:sp>
+            <a:endParaRPr lang="en-US" dirty="0">
+              <a:solidFill>
+                <a:schemeClr val="bg1"/>
+              </a:solidFill>
+            </a:endParaRPr>
+          </a:p>
+        </p:txBody>
+      </p:sp>
+      <p:pic>
+        <p:nvPicPr>
+          <p:cNvPr id="5" name="Picture 4">
+            <a:extLst>
+              <a:ext uri="{FF2B5EF4-FFF2-40B4-BE49-F238E27FC236}">
+                <a16:creationId xmlns:a16="http://schemas.microsoft.com/office/drawing/2014/main" id="{9DEFC89D-5F35-57F9-0139-E4E42CDCC14E}"/>
+              </a:ext>
+            </a:extLst>
+          </p:cNvPr>
+          <p:cNvPicPr>
+            <a:picLocks noChangeAspect="1"/>
+          </p:cNvPicPr>
+          <p:nvPr/>
+        </p:nvPicPr>
+        <p:blipFill>
+          <a:blip r:embed="rId2"/>
+          <a:stretch>
+            <a:fillRect/>
+          </a:stretch>
+        </p:blipFill>
+        <p:spPr>
+          <a:xfrm>
+            <a:off x="631195" y="4100662"/>
+            <a:ext cx="4911767" cy="1373630"/>
+          </a:xfrm>
+          <a:prstGeom prst="rect">
+            <a:avLst/>
+          </a:prstGeom>
+        </p:spPr>
+      </p:pic>
+      <p:pic>
+        <p:nvPicPr>
+          <p:cNvPr id="7" name="Picture 6">
+            <a:extLst>
+              <a:ext uri="{FF2B5EF4-FFF2-40B4-BE49-F238E27FC236}">
+                <a16:creationId xmlns:a16="http://schemas.microsoft.com/office/drawing/2014/main" id="{3B1A4631-C7C7-0742-A72F-99387BBDC4CB}"/>
+              </a:ext>
+            </a:extLst>
+          </p:cNvPr>
+          <p:cNvPicPr>
+            <a:picLocks noChangeAspect="1"/>
+          </p:cNvPicPr>
+          <p:nvPr/>
+        </p:nvPicPr>
+        <p:blipFill>
+          <a:blip r:embed="rId3"/>
+          <a:stretch>
+            <a:fillRect/>
+          </a:stretch>
+        </p:blipFill>
+        <p:spPr>
+          <a:xfrm>
+            <a:off x="6096000" y="3134079"/>
+            <a:ext cx="5867742" cy="3570746"/>
+          </a:xfrm>
+          <a:prstGeom prst="rect">
+            <a:avLst/>
+          </a:prstGeom>
+        </p:spPr>
+      </p:pic>
     </p:spTree>
     <p:extLst>
       <p:ext uri="{BB962C8B-B14F-4D97-AF65-F5344CB8AC3E}">
         <p14:creationId xmlns:p14="http://schemas.microsoft.com/office/powerpoint/2010/main" val="1081451841"/>
+      </p:ext>
+    </p:extLst>
+  </p:cSld>
+  <p:clrMapOvr>
+    <a:masterClrMapping/>
+  </p:clrMapOvr>
+</p:sld>
+</file>
+
+<file path=ppt/slides/slide9.xml><?xml version="1.0" encoding="utf-8"?>
+<p:sld xmlns:a="http://schemas.openxmlformats.org/drawingml/2006/main" xmlns:r="http://schemas.openxmlformats.org/officeDocument/2006/relationships" xmlns:p="http://schemas.openxmlformats.org/presentationml/2006/main">
+  <p:cSld>
+    <p:spTree>
+      <p:nvGrpSpPr>
+        <p:cNvPr id="1" name=""/>
+        <p:cNvGrpSpPr/>
+        <p:nvPr/>
+      </p:nvGrpSpPr>
+      <p:grpSpPr>
+        <a:xfrm>
+          <a:off x="0" y="0"/>
+          <a:ext cx="0" cy="0"/>
+          <a:chOff x="0" y="0"/>
+          <a:chExt cx="0" cy="0"/>
+        </a:xfrm>
+      </p:grpSpPr>
+      <p:sp>
+        <p:nvSpPr>
+          <p:cNvPr id="2" name="Title 1">
+            <a:extLst>
+              <a:ext uri="{FF2B5EF4-FFF2-40B4-BE49-F238E27FC236}">
+                <a16:creationId xmlns:a16="http://schemas.microsoft.com/office/drawing/2014/main" id="{B111C748-90F3-A60E-CD3A-D53A1A16A759}"/>
+              </a:ext>
+            </a:extLst>
+          </p:cNvPr>
+          <p:cNvSpPr>
+            <a:spLocks noGrp="1"/>
+          </p:cNvSpPr>
+          <p:nvPr>
+            <p:ph type="title"/>
+          </p:nvPr>
+        </p:nvSpPr>
+        <p:spPr>
+          <a:xfrm>
+            <a:off x="391981" y="1"/>
+            <a:ext cx="8534400" cy="886120"/>
+          </a:xfrm>
+        </p:spPr>
+        <p:txBody>
+          <a:bodyPr/>
+          <a:lstStyle/>
+          <a:p>
+            <a:r>
+              <a:rPr lang="hu-HU" dirty="0"/>
+              <a:t>Webshop működése</a:t>
+            </a:r>
+            <a:endParaRPr lang="en-US" dirty="0"/>
+          </a:p>
+        </p:txBody>
+      </p:sp>
+      <p:sp>
+        <p:nvSpPr>
+          <p:cNvPr id="3" name="Content Placeholder 2">
+            <a:extLst>
+              <a:ext uri="{FF2B5EF4-FFF2-40B4-BE49-F238E27FC236}">
+                <a16:creationId xmlns:a16="http://schemas.microsoft.com/office/drawing/2014/main" id="{6B98B376-F4C3-16E2-FB2E-AC76E9A20B08}"/>
+              </a:ext>
+            </a:extLst>
+          </p:cNvPr>
+          <p:cNvSpPr>
+            <a:spLocks noGrp="1"/>
+          </p:cNvSpPr>
+          <p:nvPr>
+            <p:ph idx="1"/>
+          </p:nvPr>
+        </p:nvSpPr>
+        <p:spPr>
+          <a:xfrm>
+            <a:off x="391981" y="1317397"/>
+            <a:ext cx="8534400" cy="1633194"/>
+          </a:xfrm>
+        </p:spPr>
+        <p:txBody>
+          <a:bodyPr>
+            <a:normAutofit fontScale="92500" lnSpcReduction="20000"/>
+          </a:bodyPr>
+          <a:lstStyle/>
+          <a:p>
+            <a:r>
+              <a:rPr lang="en-US" dirty="0" err="1">
+                <a:solidFill>
+                  <a:schemeClr val="bg1"/>
+                </a:solidFill>
+              </a:rPr>
+              <a:t>Rendelés</a:t>
+            </a:r>
+            <a:r>
+              <a:rPr lang="en-US" dirty="0">
+                <a:solidFill>
+                  <a:schemeClr val="bg1"/>
+                </a:solidFill>
+              </a:rPr>
+              <a:t> </a:t>
+            </a:r>
+            <a:r>
+              <a:rPr lang="en-US" dirty="0" err="1">
+                <a:solidFill>
+                  <a:schemeClr val="bg1"/>
+                </a:solidFill>
+              </a:rPr>
+              <a:t>leadása</a:t>
+            </a:r>
+            <a:r>
+              <a:rPr lang="en-US" dirty="0">
+                <a:solidFill>
+                  <a:schemeClr val="bg1"/>
+                </a:solidFill>
+              </a:rPr>
+              <a:t> </a:t>
+            </a:r>
+            <a:r>
+              <a:rPr lang="en-US" dirty="0" err="1">
+                <a:solidFill>
+                  <a:schemeClr val="bg1"/>
+                </a:solidFill>
+              </a:rPr>
+              <a:t>és</a:t>
+            </a:r>
+            <a:r>
+              <a:rPr lang="en-US" dirty="0">
+                <a:solidFill>
+                  <a:schemeClr val="bg1"/>
+                </a:solidFill>
+              </a:rPr>
+              <a:t> </a:t>
+            </a:r>
+            <a:r>
+              <a:rPr lang="en-US" dirty="0" err="1">
+                <a:solidFill>
+                  <a:schemeClr val="bg1"/>
+                </a:solidFill>
+              </a:rPr>
+              <a:t>nyomon</a:t>
+            </a:r>
+            <a:r>
+              <a:rPr lang="en-US" dirty="0">
+                <a:solidFill>
+                  <a:schemeClr val="bg1"/>
+                </a:solidFill>
+              </a:rPr>
+              <a:t> </a:t>
+            </a:r>
+            <a:r>
+              <a:rPr lang="en-US" dirty="0" err="1">
+                <a:solidFill>
+                  <a:schemeClr val="bg1"/>
+                </a:solidFill>
+              </a:rPr>
+              <a:t>követés</a:t>
+            </a:r>
+            <a:r>
+              <a:rPr lang="en-US" dirty="0">
+                <a:solidFill>
+                  <a:schemeClr val="bg1"/>
+                </a:solidFill>
+              </a:rPr>
+              <a:t>: </a:t>
+            </a:r>
+          </a:p>
+          <a:p>
+            <a:pPr marL="0" indent="0">
+              <a:buNone/>
+            </a:pPr>
+            <a:endParaRPr lang="en-US" dirty="0">
+              <a:solidFill>
+                <a:schemeClr val="bg1"/>
+              </a:solidFill>
+            </a:endParaRPr>
+          </a:p>
+          <a:p>
+            <a:pPr marL="0" indent="0">
+              <a:buNone/>
+            </a:pPr>
+            <a:r>
+              <a:rPr lang="en-US" dirty="0">
+                <a:solidFill>
+                  <a:schemeClr val="bg1"/>
+                </a:solidFill>
+              </a:rPr>
+              <a:t>A </a:t>
+            </a:r>
+            <a:r>
+              <a:rPr lang="en-US" dirty="0" err="1">
+                <a:solidFill>
+                  <a:schemeClr val="bg1"/>
+                </a:solidFill>
+              </a:rPr>
+              <a:t>felhasználók</a:t>
+            </a:r>
+            <a:r>
+              <a:rPr lang="en-US" dirty="0">
+                <a:solidFill>
+                  <a:schemeClr val="bg1"/>
+                </a:solidFill>
+              </a:rPr>
+              <a:t> </a:t>
+            </a:r>
+            <a:r>
+              <a:rPr lang="en-US" dirty="0" err="1">
+                <a:solidFill>
+                  <a:schemeClr val="bg1"/>
+                </a:solidFill>
+              </a:rPr>
+              <a:t>rendeléseiket</a:t>
+            </a:r>
+            <a:r>
+              <a:rPr lang="en-US" dirty="0">
+                <a:solidFill>
+                  <a:schemeClr val="bg1"/>
+                </a:solidFill>
+              </a:rPr>
+              <a:t> </a:t>
+            </a:r>
+            <a:r>
+              <a:rPr lang="en-US" dirty="0" err="1">
+                <a:solidFill>
+                  <a:schemeClr val="bg1"/>
+                </a:solidFill>
+              </a:rPr>
+              <a:t>az</a:t>
+            </a:r>
+            <a:r>
+              <a:rPr lang="en-US" dirty="0">
+                <a:solidFill>
+                  <a:schemeClr val="bg1"/>
+                </a:solidFill>
+              </a:rPr>
+              <a:t> orders </a:t>
+            </a:r>
+            <a:r>
+              <a:rPr lang="en-US" dirty="0" err="1">
+                <a:solidFill>
+                  <a:schemeClr val="bg1"/>
+                </a:solidFill>
+              </a:rPr>
+              <a:t>és</a:t>
+            </a:r>
+            <a:r>
+              <a:rPr lang="en-US" dirty="0">
+                <a:solidFill>
+                  <a:schemeClr val="bg1"/>
+                </a:solidFill>
+              </a:rPr>
+              <a:t> </a:t>
+            </a:r>
+            <a:r>
+              <a:rPr lang="en-US" dirty="0" err="1">
+                <a:solidFill>
+                  <a:schemeClr val="bg1"/>
+                </a:solidFill>
+              </a:rPr>
+              <a:t>orders_items</a:t>
+            </a:r>
+            <a:r>
+              <a:rPr lang="en-US" dirty="0">
+                <a:solidFill>
+                  <a:schemeClr val="bg1"/>
+                </a:solidFill>
+              </a:rPr>
+              <a:t> </a:t>
+            </a:r>
+            <a:r>
+              <a:rPr lang="en-US" dirty="0" err="1">
+                <a:solidFill>
+                  <a:schemeClr val="bg1"/>
+                </a:solidFill>
+              </a:rPr>
+              <a:t>táblákban</a:t>
+            </a:r>
+            <a:r>
+              <a:rPr lang="en-US" dirty="0">
+                <a:solidFill>
+                  <a:schemeClr val="bg1"/>
+                </a:solidFill>
+              </a:rPr>
+              <a:t> </a:t>
+            </a:r>
+            <a:r>
+              <a:rPr lang="en-US" dirty="0" err="1">
+                <a:solidFill>
+                  <a:schemeClr val="bg1"/>
+                </a:solidFill>
+              </a:rPr>
+              <a:t>tárolják</a:t>
+            </a:r>
+            <a:r>
+              <a:rPr lang="en-US" dirty="0">
+                <a:solidFill>
+                  <a:schemeClr val="bg1"/>
+                </a:solidFill>
+              </a:rPr>
+              <a:t>. A </a:t>
+            </a:r>
+            <a:r>
+              <a:rPr lang="en-US" dirty="0" err="1">
+                <a:solidFill>
+                  <a:schemeClr val="bg1"/>
+                </a:solidFill>
+              </a:rPr>
+              <a:t>rendelés</a:t>
+            </a:r>
+            <a:r>
+              <a:rPr lang="en-US" dirty="0">
+                <a:solidFill>
+                  <a:schemeClr val="bg1"/>
+                </a:solidFill>
+              </a:rPr>
+              <a:t> </a:t>
+            </a:r>
+            <a:r>
+              <a:rPr lang="en-US" dirty="0" err="1">
+                <a:solidFill>
+                  <a:schemeClr val="bg1"/>
+                </a:solidFill>
+              </a:rPr>
+              <a:t>egyedi</a:t>
+            </a:r>
+            <a:r>
+              <a:rPr lang="en-US" dirty="0">
+                <a:solidFill>
+                  <a:schemeClr val="bg1"/>
+                </a:solidFill>
+              </a:rPr>
+              <a:t> </a:t>
+            </a:r>
+            <a:r>
+              <a:rPr lang="en-US" dirty="0" err="1">
+                <a:solidFill>
+                  <a:schemeClr val="bg1"/>
+                </a:solidFill>
+              </a:rPr>
+              <a:t>order_id-val</a:t>
+            </a:r>
+            <a:r>
+              <a:rPr lang="en-US" dirty="0">
+                <a:solidFill>
+                  <a:schemeClr val="bg1"/>
+                </a:solidFill>
+              </a:rPr>
+              <a:t> van </a:t>
+            </a:r>
+            <a:r>
+              <a:rPr lang="en-US" dirty="0" err="1">
+                <a:solidFill>
+                  <a:schemeClr val="bg1"/>
+                </a:solidFill>
+              </a:rPr>
+              <a:t>azonosítva</a:t>
+            </a:r>
+            <a:r>
+              <a:rPr lang="en-US" dirty="0">
+                <a:solidFill>
+                  <a:schemeClr val="bg1"/>
+                </a:solidFill>
+              </a:rPr>
+              <a:t>, </a:t>
+            </a:r>
+            <a:r>
+              <a:rPr lang="en-US" dirty="0" err="1">
+                <a:solidFill>
+                  <a:schemeClr val="bg1"/>
+                </a:solidFill>
+              </a:rPr>
+              <a:t>amely</a:t>
+            </a:r>
+            <a:r>
+              <a:rPr lang="en-US" dirty="0">
+                <a:solidFill>
+                  <a:schemeClr val="bg1"/>
+                </a:solidFill>
+              </a:rPr>
+              <a:t> </a:t>
+            </a:r>
+            <a:r>
+              <a:rPr lang="en-US" dirty="0" err="1">
+                <a:solidFill>
+                  <a:schemeClr val="bg1"/>
+                </a:solidFill>
+              </a:rPr>
+              <a:t>lehetővé</a:t>
+            </a:r>
+            <a:r>
+              <a:rPr lang="en-US" dirty="0">
+                <a:solidFill>
+                  <a:schemeClr val="bg1"/>
+                </a:solidFill>
+              </a:rPr>
+              <a:t> </a:t>
+            </a:r>
+            <a:r>
+              <a:rPr lang="en-US" dirty="0" err="1">
+                <a:solidFill>
+                  <a:schemeClr val="bg1"/>
+                </a:solidFill>
+              </a:rPr>
+              <a:t>teszi</a:t>
+            </a:r>
+            <a:r>
+              <a:rPr lang="en-US" dirty="0">
+                <a:solidFill>
+                  <a:schemeClr val="bg1"/>
+                </a:solidFill>
+              </a:rPr>
+              <a:t> a </a:t>
+            </a:r>
+            <a:r>
+              <a:rPr lang="en-US" dirty="0" err="1">
+                <a:solidFill>
+                  <a:schemeClr val="bg1"/>
+                </a:solidFill>
+              </a:rPr>
+              <a:t>rendelési</a:t>
+            </a:r>
+            <a:r>
+              <a:rPr lang="en-US" dirty="0">
+                <a:solidFill>
+                  <a:schemeClr val="bg1"/>
+                </a:solidFill>
+              </a:rPr>
+              <a:t> </a:t>
+            </a:r>
+            <a:r>
+              <a:rPr lang="en-US" dirty="0" err="1">
+                <a:solidFill>
+                  <a:schemeClr val="bg1"/>
+                </a:solidFill>
+              </a:rPr>
+              <a:t>tételek</a:t>
+            </a:r>
+            <a:r>
+              <a:rPr lang="en-US" dirty="0">
+                <a:solidFill>
+                  <a:schemeClr val="bg1"/>
+                </a:solidFill>
+              </a:rPr>
+              <a:t> </a:t>
+            </a:r>
+            <a:r>
+              <a:rPr lang="en-US" dirty="0" err="1">
+                <a:solidFill>
+                  <a:schemeClr val="bg1"/>
+                </a:solidFill>
+              </a:rPr>
+              <a:t>lekérdezését</a:t>
+            </a:r>
+            <a:r>
+              <a:rPr lang="en-US" dirty="0">
+                <a:solidFill>
+                  <a:schemeClr val="bg1"/>
+                </a:solidFill>
+              </a:rPr>
+              <a:t>.</a:t>
+            </a:r>
+          </a:p>
+          <a:p>
+            <a:endParaRPr lang="en-US" dirty="0">
+              <a:solidFill>
+                <a:schemeClr val="bg1"/>
+              </a:solidFill>
+            </a:endParaRPr>
+          </a:p>
+        </p:txBody>
+      </p:sp>
+      <p:pic>
+        <p:nvPicPr>
+          <p:cNvPr id="5" name="Picture 4">
+            <a:extLst>
+              <a:ext uri="{FF2B5EF4-FFF2-40B4-BE49-F238E27FC236}">
+                <a16:creationId xmlns:a16="http://schemas.microsoft.com/office/drawing/2014/main" id="{D52E9FA0-ABBB-0397-1869-57D0BE48A9EF}"/>
+              </a:ext>
+            </a:extLst>
+          </p:cNvPr>
+          <p:cNvPicPr>
+            <a:picLocks noChangeAspect="1"/>
+          </p:cNvPicPr>
+          <p:nvPr/>
+        </p:nvPicPr>
+        <p:blipFill>
+          <a:blip r:embed="rId2"/>
+          <a:stretch>
+            <a:fillRect/>
+          </a:stretch>
+        </p:blipFill>
+        <p:spPr>
+          <a:xfrm>
+            <a:off x="3856631" y="2950591"/>
+            <a:ext cx="4478737" cy="3757813"/>
+          </a:xfrm>
+          <a:prstGeom prst="rect">
+            <a:avLst/>
+          </a:prstGeom>
+        </p:spPr>
+      </p:pic>
+    </p:spTree>
+    <p:extLst>
+      <p:ext uri="{BB962C8B-B14F-4D97-AF65-F5344CB8AC3E}">
+        <p14:creationId xmlns:p14="http://schemas.microsoft.com/office/powerpoint/2010/main" val="378716864"/>
       </p:ext>
     </p:extLst>
   </p:cSld>

</xml_diff>